<commit_message>
FEAT: Added code to check an XODR bounding box and fix it if it is not correct.
</commit_message>
<xml_diff>
--- a/Documents/OpenDRIVE-MATLAB.pptx
+++ b/Documents/OpenDRIVE-MATLAB.pptx
@@ -112,6 +112,11 @@
       </a:defRPr>
     </a:lvl9pPr>
   </p:defaultTextStyle>
+  <p:extLst>
+    <p:ext uri="{EFAFB233-063F-42B5-8137-9DF3F51BA10A}">
+      <p15:sldGuideLst xmlns:p15="http://schemas.microsoft.com/office/powerpoint/2012/main"/>
+    </p:ext>
+  </p:extLst>
 </p:presentation>
 </file>
 
@@ -129,7 +134,7 @@
       <pc:sldMk xmlns:pc="http://schemas.microsoft.com/office/powerpoint/2013/main/command" cId="3164655143" sldId="260"/>
       <ac:spMk id="3" creationId="{F47E3397-DD83-5944-915F-B1C23D4146CB}"/>
       <ac:txMk cp="451" len="71">
-        <ac:context len="700" hash="4021820717"/>
+        <ac:context len="686" hash="1500207409"/>
       </ac:txMk>
     </ac:txMkLst>
     <p188:pos x="8367793" y="3180328"/>
@@ -150,7 +155,7 @@
       <pc:sldMk xmlns:pc="http://schemas.microsoft.com/office/powerpoint/2013/main/command" cId="3164655143" sldId="260"/>
       <ac:spMk id="3" creationId="{F47E3397-DD83-5944-915F-B1C23D4146CB}"/>
       <ac:txMk cp="523" len="91">
-        <ac:context len="700" hash="4021820717"/>
+        <ac:context len="686" hash="1500207409"/>
       </ac:txMk>
     </ac:txMkLst>
     <p188:pos x="10522058" y="3505792"/>
@@ -250,7 +255,7 @@
           <a:p>
             <a:fld id="{E25F55F3-6C47-6F44-AA6F-8C97BF80ABB6}" type="datetimeFigureOut">
               <a:rPr lang="en-US" smtClean="0"/>
-              <a:t>3/25/22</a:t>
+              <a:t>3/28/22</a:t>
             </a:fld>
             <a:endParaRPr lang="en-US"/>
           </a:p>
@@ -748,7 +753,7 @@
           <a:p>
             <a:fld id="{34B42132-7ACE-EE46-9408-A55182111835}" type="datetimeFigureOut">
               <a:rPr lang="en-US" smtClean="0"/>
-              <a:t>3/25/22</a:t>
+              <a:t>3/28/22</a:t>
             </a:fld>
             <a:endParaRPr lang="en-US"/>
           </a:p>
@@ -946,7 +951,7 @@
           <a:p>
             <a:fld id="{34B42132-7ACE-EE46-9408-A55182111835}" type="datetimeFigureOut">
               <a:rPr lang="en-US" smtClean="0"/>
-              <a:t>3/25/22</a:t>
+              <a:t>3/28/22</a:t>
             </a:fld>
             <a:endParaRPr lang="en-US"/>
           </a:p>
@@ -1154,7 +1159,7 @@
           <a:p>
             <a:fld id="{34B42132-7ACE-EE46-9408-A55182111835}" type="datetimeFigureOut">
               <a:rPr lang="en-US" smtClean="0"/>
-              <a:t>3/25/22</a:t>
+              <a:t>3/28/22</a:t>
             </a:fld>
             <a:endParaRPr lang="en-US"/>
           </a:p>
@@ -1352,7 +1357,7 @@
           <a:p>
             <a:fld id="{34B42132-7ACE-EE46-9408-A55182111835}" type="datetimeFigureOut">
               <a:rPr lang="en-US" smtClean="0"/>
-              <a:t>3/25/22</a:t>
+              <a:t>3/28/22</a:t>
             </a:fld>
             <a:endParaRPr lang="en-US"/>
           </a:p>
@@ -1627,7 +1632,7 @@
           <a:p>
             <a:fld id="{34B42132-7ACE-EE46-9408-A55182111835}" type="datetimeFigureOut">
               <a:rPr lang="en-US" smtClean="0"/>
-              <a:t>3/25/22</a:t>
+              <a:t>3/28/22</a:t>
             </a:fld>
             <a:endParaRPr lang="en-US"/>
           </a:p>
@@ -1892,7 +1897,7 @@
           <a:p>
             <a:fld id="{34B42132-7ACE-EE46-9408-A55182111835}" type="datetimeFigureOut">
               <a:rPr lang="en-US" smtClean="0"/>
-              <a:t>3/25/22</a:t>
+              <a:t>3/28/22</a:t>
             </a:fld>
             <a:endParaRPr lang="en-US"/>
           </a:p>
@@ -2304,7 +2309,7 @@
           <a:p>
             <a:fld id="{34B42132-7ACE-EE46-9408-A55182111835}" type="datetimeFigureOut">
               <a:rPr lang="en-US" smtClean="0"/>
-              <a:t>3/25/22</a:t>
+              <a:t>3/28/22</a:t>
             </a:fld>
             <a:endParaRPr lang="en-US"/>
           </a:p>
@@ -2445,7 +2450,7 @@
           <a:p>
             <a:fld id="{34B42132-7ACE-EE46-9408-A55182111835}" type="datetimeFigureOut">
               <a:rPr lang="en-US" smtClean="0"/>
-              <a:t>3/25/22</a:t>
+              <a:t>3/28/22</a:t>
             </a:fld>
             <a:endParaRPr lang="en-US"/>
           </a:p>
@@ -2558,7 +2563,7 @@
           <a:p>
             <a:fld id="{34B42132-7ACE-EE46-9408-A55182111835}" type="datetimeFigureOut">
               <a:rPr lang="en-US" smtClean="0"/>
-              <a:t>3/25/22</a:t>
+              <a:t>3/28/22</a:t>
             </a:fld>
             <a:endParaRPr lang="en-US"/>
           </a:p>
@@ -2869,7 +2874,7 @@
           <a:p>
             <a:fld id="{34B42132-7ACE-EE46-9408-A55182111835}" type="datetimeFigureOut">
               <a:rPr lang="en-US" smtClean="0"/>
-              <a:t>3/25/22</a:t>
+              <a:t>3/28/22</a:t>
             </a:fld>
             <a:endParaRPr lang="en-US"/>
           </a:p>
@@ -3157,7 +3162,7 @@
           <a:p>
             <a:fld id="{34B42132-7ACE-EE46-9408-A55182111835}" type="datetimeFigureOut">
               <a:rPr lang="en-US" smtClean="0"/>
-              <a:t>3/25/22</a:t>
+              <a:t>3/28/22</a:t>
             </a:fld>
             <a:endParaRPr lang="en-US"/>
           </a:p>
@@ -3398,7 +3403,7 @@
           <a:p>
             <a:fld id="{34B42132-7ACE-EE46-9408-A55182111835}" type="datetimeFigureOut">
               <a:rPr lang="en-US" smtClean="0"/>
-              <a:t>3/25/22</a:t>
+              <a:t>3/28/22</a:t>
             </a:fld>
             <a:endParaRPr lang="en-US"/>
           </a:p>
@@ -3933,7 +3938,12 @@
             <p:ph type="title"/>
           </p:nvPr>
         </p:nvSpPr>
-        <p:spPr/>
+        <p:spPr>
+          <a:xfrm>
+            <a:off x="0" y="18255"/>
+            <a:ext cx="10515600" cy="1325563"/>
+          </a:xfrm>
+        </p:spPr>
         <p:txBody>
           <a:bodyPr/>
           <a:lstStyle/>
@@ -3965,10 +3975,15 @@
             <p:ph idx="1"/>
           </p:nvPr>
         </p:nvSpPr>
-        <p:spPr/>
+        <p:spPr>
+          <a:xfrm>
+            <a:off x="0" y="1343817"/>
+            <a:ext cx="12192000" cy="5495927"/>
+          </a:xfrm>
+        </p:spPr>
         <p:txBody>
           <a:bodyPr>
-            <a:normAutofit fontScale="92500" lnSpcReduction="20000"/>
+            <a:normAutofit lnSpcReduction="10000"/>
           </a:bodyPr>
           <a:lstStyle/>
           <a:p>
@@ -3989,8 +4004,15 @@
             <a:pPr lvl="2"/>
             <a:r>
               <a:rPr lang="en-US" dirty="0"/>
-              <a:t>Header</a:t>
-            </a:r>
+              <a:t>Header </a:t>
+            </a:r>
+            <a:r>
+              <a:rPr lang="en-US" dirty="0">
+                <a:sym typeface="Wingdings" pitchFamily="2" charset="2"/>
+              </a:rPr>
+              <a:t> bounding box defined by west, east, south, north limit values</a:t>
+            </a:r>
+            <a:endParaRPr lang="en-US" dirty="0"/>
           </a:p>
           <a:p>
             <a:pPr lvl="2"/>
@@ -4255,7 +4277,12 @@
             <p:ph type="title"/>
           </p:nvPr>
         </p:nvSpPr>
-        <p:spPr/>
+        <p:spPr>
+          <a:xfrm>
+            <a:off x="0" y="18255"/>
+            <a:ext cx="10515600" cy="1325563"/>
+          </a:xfrm>
+        </p:spPr>
         <p:txBody>
           <a:bodyPr/>
           <a:lstStyle/>
@@ -4287,7 +4314,12 @@
             <p:ph idx="1"/>
           </p:nvPr>
         </p:nvSpPr>
-        <p:spPr/>
+        <p:spPr>
+          <a:xfrm>
+            <a:off x="0" y="1343818"/>
+            <a:ext cx="12192000" cy="5495927"/>
+          </a:xfrm>
+        </p:spPr>
         <p:txBody>
           <a:bodyPr/>
           <a:lstStyle/>
@@ -4403,7 +4435,12 @@
             <p:ph type="title"/>
           </p:nvPr>
         </p:nvSpPr>
-        <p:spPr/>
+        <p:spPr>
+          <a:xfrm>
+            <a:off x="0" y="18255"/>
+            <a:ext cx="12192000" cy="1325563"/>
+          </a:xfrm>
+        </p:spPr>
         <p:txBody>
           <a:bodyPr/>
           <a:lstStyle/>
@@ -4439,7 +4476,12 @@
             <p:ph idx="1"/>
           </p:nvPr>
         </p:nvSpPr>
-        <p:spPr/>
+        <p:spPr>
+          <a:xfrm>
+            <a:off x="0" y="1343817"/>
+            <a:ext cx="12192000" cy="5495927"/>
+          </a:xfrm>
+        </p:spPr>
         <p:txBody>
           <a:bodyPr/>
           <a:lstStyle/>
@@ -4524,7 +4566,12 @@
             <p:ph type="title"/>
           </p:nvPr>
         </p:nvSpPr>
-        <p:spPr/>
+        <p:spPr>
+          <a:xfrm>
+            <a:off x="0" y="18255"/>
+            <a:ext cx="10515600" cy="1325563"/>
+          </a:xfrm>
+        </p:spPr>
         <p:txBody>
           <a:bodyPr/>
           <a:lstStyle/>
@@ -4560,9 +4607,16 @@
             <p:ph idx="1"/>
           </p:nvPr>
         </p:nvSpPr>
-        <p:spPr/>
-        <p:txBody>
-          <a:bodyPr/>
+        <p:spPr>
+          <a:xfrm>
+            <a:off x="0" y="1343818"/>
+            <a:ext cx="12192000" cy="5495927"/>
+          </a:xfrm>
+        </p:spPr>
+        <p:txBody>
+          <a:bodyPr>
+            <a:normAutofit/>
+          </a:bodyPr>
           <a:lstStyle/>
           <a:p>
             <a:r>
@@ -4578,10 +4632,77 @@
             </a:r>
           </a:p>
           <a:p>
+            <a:pPr lvl="1"/>
+            <a:r>
+              <a:rPr lang="en-US" dirty="0">
+                <a:solidFill>
+                  <a:schemeClr val="accent6">
+                    <a:lumMod val="75000"/>
+                  </a:schemeClr>
+                </a:solidFill>
+              </a:rPr>
+              <a:t>Addressed by </a:t>
+            </a:r>
+            <a:r>
+              <a:rPr lang="en-US" dirty="0" err="1">
+                <a:solidFill>
+                  <a:schemeClr val="accent6">
+                    <a:lumMod val="75000"/>
+                  </a:schemeClr>
+                </a:solidFill>
+              </a:rPr>
+              <a:t>fcn_RoadSeg_convertXODRtoMATLABStruct</a:t>
+            </a:r>
+            <a:r>
+              <a:rPr lang="en-US" dirty="0">
+                <a:solidFill>
+                  <a:schemeClr val="accent6">
+                    <a:lumMod val="75000"/>
+                  </a:schemeClr>
+                </a:solidFill>
+              </a:rPr>
+              <a:t>()</a:t>
+            </a:r>
+          </a:p>
+          <a:p>
             <a:r>
               <a:rPr lang="en-US" dirty="0"/>
               <a:t>Reliant on proper XODR formatting to ensure segment ordering is correct (in order of increasing station)</a:t>
             </a:r>
+          </a:p>
+          <a:p>
+            <a:pPr lvl="1"/>
+            <a:r>
+              <a:rPr lang="en-US" dirty="0">
+                <a:solidFill>
+                  <a:schemeClr val="accent6">
+                    <a:lumMod val="75000"/>
+                  </a:schemeClr>
+                </a:solidFill>
+              </a:rPr>
+              <a:t>Addressed by </a:t>
+            </a:r>
+            <a:r>
+              <a:rPr lang="en-US" dirty="0" err="1">
+                <a:solidFill>
+                  <a:schemeClr val="accent6">
+                    <a:lumMod val="75000"/>
+                  </a:schemeClr>
+                </a:solidFill>
+              </a:rPr>
+              <a:t>fcn_RoadSeg_XODRSegmentChecks</a:t>
+            </a:r>
+            <a:r>
+              <a:rPr lang="en-US" dirty="0">
+                <a:solidFill>
+                  <a:schemeClr val="accent6">
+                    <a:lumMod val="75000"/>
+                  </a:schemeClr>
+                </a:solidFill>
+              </a:rPr>
+              <a:t>()</a:t>
+            </a:r>
+            <a:endParaRPr lang="en-US" dirty="0"/>
           </a:p>
           <a:p>
             <a:r>
@@ -4618,6 +4739,39 @@
             <a:r>
               <a:rPr lang="en-US" dirty="0"/>
               <a:t> matches with (x0,y0) as well as h0 at s0 of the next segment</a:t>
+            </a:r>
+          </a:p>
+          <a:p>
+            <a:pPr lvl="1"/>
+            <a:r>
+              <a:rPr lang="en-US" dirty="0">
+                <a:solidFill>
+                  <a:schemeClr val="accent6">
+                    <a:lumMod val="75000"/>
+                  </a:schemeClr>
+                </a:solidFill>
+              </a:rPr>
+              <a:t>Addressed by </a:t>
+            </a:r>
+            <a:r>
+              <a:rPr lang="en-US" dirty="0" err="1">
+                <a:solidFill>
+                  <a:schemeClr val="accent6">
+                    <a:lumMod val="75000"/>
+                  </a:schemeClr>
+                </a:solidFill>
+              </a:rPr>
+              <a:t>fcn_RoadSeg_XODRSegmentChecks</a:t>
+            </a:r>
+            <a:r>
+              <a:rPr lang="en-US" dirty="0">
+                <a:solidFill>
+                  <a:schemeClr val="accent6">
+                    <a:lumMod val="75000"/>
+                  </a:schemeClr>
+                </a:solidFill>
+              </a:rPr>
+              <a:t>()</a:t>
             </a:r>
           </a:p>
         </p:txBody>
@@ -4823,16 +4977,6 @@
             <a:r>
               <a:rPr lang="en-US" dirty="0"/>
               <a:t>Plot patch objects using the patch plot functions in the patch library</a:t>
-            </a:r>
-          </a:p>
-          <a:p>
-            <a:r>
-              <a:rPr lang="en-US" dirty="0" err="1"/>
-              <a:t>OpenDRIVE</a:t>
-            </a:r>
-            <a:r>
-              <a:rPr lang="en-US" dirty="0"/>
-              <a:t> to </a:t>
             </a:r>
           </a:p>
         </p:txBody>

</xml_diff>

<commit_message>
FEAT: Added a wrapper function to call the function for finding XY coords from ST coords with the appropriate arguments for the various types of road segments
</commit_message>
<xml_diff>
--- a/Documents/OpenDRIVE-MATLAB.pptx
+++ b/Documents/OpenDRIVE-MATLAB.pptx
@@ -255,7 +255,7 @@
           <a:p>
             <a:fld id="{E25F55F3-6C47-6F44-AA6F-8C97BF80ABB6}" type="datetimeFigureOut">
               <a:rPr lang="en-US" smtClean="0"/>
-              <a:t>3/28/22</a:t>
+              <a:t>4/1/22</a:t>
             </a:fld>
             <a:endParaRPr lang="en-US"/>
           </a:p>
@@ -587,6 +587,90 @@
           <a:p>
             <a:fld id="{BEEFB87A-38AE-FD43-80BF-6BA280226820}" type="slidenum">
               <a:rPr lang="en-US" smtClean="0"/>
+              <a:t>2</a:t>
+            </a:fld>
+            <a:endParaRPr lang="en-US"/>
+          </a:p>
+        </p:txBody>
+      </p:sp>
+    </p:spTree>
+    <p:extLst>
+      <p:ext uri="{BB962C8B-B14F-4D97-AF65-F5344CB8AC3E}">
+        <p14:creationId xmlns:p14="http://schemas.microsoft.com/office/powerpoint/2010/main" val="45817430"/>
+      </p:ext>
+    </p:extLst>
+  </p:cSld>
+  <p:clrMapOvr>
+    <a:masterClrMapping/>
+  </p:clrMapOvr>
+</p:notes>
+</file>
+
+<file path=ppt/notesSlides/notesSlide2.xml><?xml version="1.0" encoding="utf-8"?>
+<p:notes xmlns:a="http://schemas.openxmlformats.org/drawingml/2006/main" xmlns:r="http://schemas.openxmlformats.org/officeDocument/2006/relationships" xmlns:p="http://schemas.openxmlformats.org/presentationml/2006/main">
+  <p:cSld>
+    <p:spTree>
+      <p:nvGrpSpPr>
+        <p:cNvPr id="1" name=""/>
+        <p:cNvGrpSpPr/>
+        <p:nvPr/>
+      </p:nvGrpSpPr>
+      <p:grpSpPr>
+        <a:xfrm>
+          <a:off x="0" y="0"/>
+          <a:ext cx="0" cy="0"/>
+          <a:chOff x="0" y="0"/>
+          <a:chExt cx="0" cy="0"/>
+        </a:xfrm>
+      </p:grpSpPr>
+      <p:sp>
+        <p:nvSpPr>
+          <p:cNvPr id="2" name="Slide Image Placeholder 1"/>
+          <p:cNvSpPr>
+            <a:spLocks noGrp="1" noRot="1" noChangeAspect="1"/>
+          </p:cNvSpPr>
+          <p:nvPr>
+            <p:ph type="sldImg"/>
+          </p:nvPr>
+        </p:nvSpPr>
+        <p:spPr/>
+      </p:sp>
+      <p:sp>
+        <p:nvSpPr>
+          <p:cNvPr id="3" name="Notes Placeholder 2"/>
+          <p:cNvSpPr>
+            <a:spLocks noGrp="1"/>
+          </p:cNvSpPr>
+          <p:nvPr>
+            <p:ph type="body" idx="1"/>
+          </p:nvPr>
+        </p:nvSpPr>
+        <p:spPr/>
+        <p:txBody>
+          <a:bodyPr/>
+          <a:lstStyle/>
+          <a:p>
+            <a:endParaRPr lang="en-US" dirty="0"/>
+          </a:p>
+        </p:txBody>
+      </p:sp>
+      <p:sp>
+        <p:nvSpPr>
+          <p:cNvPr id="4" name="Slide Number Placeholder 3"/>
+          <p:cNvSpPr>
+            <a:spLocks noGrp="1"/>
+          </p:cNvSpPr>
+          <p:nvPr>
+            <p:ph type="sldNum" sz="quarter" idx="5"/>
+          </p:nvPr>
+        </p:nvSpPr>
+        <p:spPr/>
+        <p:txBody>
+          <a:bodyPr/>
+          <a:lstStyle/>
+          <a:p>
+            <a:fld id="{BEEFB87A-38AE-FD43-80BF-6BA280226820}" type="slidenum">
+              <a:rPr lang="en-US" smtClean="0"/>
               <a:t>6</a:t>
             </a:fld>
             <a:endParaRPr lang="en-US"/>
@@ -753,7 +837,7 @@
           <a:p>
             <a:fld id="{34B42132-7ACE-EE46-9408-A55182111835}" type="datetimeFigureOut">
               <a:rPr lang="en-US" smtClean="0"/>
-              <a:t>3/28/22</a:t>
+              <a:t>4/1/22</a:t>
             </a:fld>
             <a:endParaRPr lang="en-US"/>
           </a:p>
@@ -951,7 +1035,7 @@
           <a:p>
             <a:fld id="{34B42132-7ACE-EE46-9408-A55182111835}" type="datetimeFigureOut">
               <a:rPr lang="en-US" smtClean="0"/>
-              <a:t>3/28/22</a:t>
+              <a:t>4/1/22</a:t>
             </a:fld>
             <a:endParaRPr lang="en-US"/>
           </a:p>
@@ -1159,7 +1243,7 @@
           <a:p>
             <a:fld id="{34B42132-7ACE-EE46-9408-A55182111835}" type="datetimeFigureOut">
               <a:rPr lang="en-US" smtClean="0"/>
-              <a:t>3/28/22</a:t>
+              <a:t>4/1/22</a:t>
             </a:fld>
             <a:endParaRPr lang="en-US"/>
           </a:p>
@@ -1357,7 +1441,7 @@
           <a:p>
             <a:fld id="{34B42132-7ACE-EE46-9408-A55182111835}" type="datetimeFigureOut">
               <a:rPr lang="en-US" smtClean="0"/>
-              <a:t>3/28/22</a:t>
+              <a:t>4/1/22</a:t>
             </a:fld>
             <a:endParaRPr lang="en-US"/>
           </a:p>
@@ -1632,7 +1716,7 @@
           <a:p>
             <a:fld id="{34B42132-7ACE-EE46-9408-A55182111835}" type="datetimeFigureOut">
               <a:rPr lang="en-US" smtClean="0"/>
-              <a:t>3/28/22</a:t>
+              <a:t>4/1/22</a:t>
             </a:fld>
             <a:endParaRPr lang="en-US"/>
           </a:p>
@@ -1897,7 +1981,7 @@
           <a:p>
             <a:fld id="{34B42132-7ACE-EE46-9408-A55182111835}" type="datetimeFigureOut">
               <a:rPr lang="en-US" smtClean="0"/>
-              <a:t>3/28/22</a:t>
+              <a:t>4/1/22</a:t>
             </a:fld>
             <a:endParaRPr lang="en-US"/>
           </a:p>
@@ -2309,7 +2393,7 @@
           <a:p>
             <a:fld id="{34B42132-7ACE-EE46-9408-A55182111835}" type="datetimeFigureOut">
               <a:rPr lang="en-US" smtClean="0"/>
-              <a:t>3/28/22</a:t>
+              <a:t>4/1/22</a:t>
             </a:fld>
             <a:endParaRPr lang="en-US"/>
           </a:p>
@@ -2450,7 +2534,7 @@
           <a:p>
             <a:fld id="{34B42132-7ACE-EE46-9408-A55182111835}" type="datetimeFigureOut">
               <a:rPr lang="en-US" smtClean="0"/>
-              <a:t>3/28/22</a:t>
+              <a:t>4/1/22</a:t>
             </a:fld>
             <a:endParaRPr lang="en-US"/>
           </a:p>
@@ -2563,7 +2647,7 @@
           <a:p>
             <a:fld id="{34B42132-7ACE-EE46-9408-A55182111835}" type="datetimeFigureOut">
               <a:rPr lang="en-US" smtClean="0"/>
-              <a:t>3/28/22</a:t>
+              <a:t>4/1/22</a:t>
             </a:fld>
             <a:endParaRPr lang="en-US"/>
           </a:p>
@@ -2874,7 +2958,7 @@
           <a:p>
             <a:fld id="{34B42132-7ACE-EE46-9408-A55182111835}" type="datetimeFigureOut">
               <a:rPr lang="en-US" smtClean="0"/>
-              <a:t>3/28/22</a:t>
+              <a:t>4/1/22</a:t>
             </a:fld>
             <a:endParaRPr lang="en-US"/>
           </a:p>
@@ -3162,7 +3246,7 @@
           <a:p>
             <a:fld id="{34B42132-7ACE-EE46-9408-A55182111835}" type="datetimeFigureOut">
               <a:rPr lang="en-US" smtClean="0"/>
-              <a:t>3/28/22</a:t>
+              <a:t>4/1/22</a:t>
             </a:fld>
             <a:endParaRPr lang="en-US"/>
           </a:p>
@@ -3403,7 +3487,7 @@
           <a:p>
             <a:fld id="{34B42132-7ACE-EE46-9408-A55182111835}" type="datetimeFigureOut">
               <a:rPr lang="en-US" smtClean="0"/>
-              <a:t>3/28/22</a:t>
+              <a:t>4/1/22</a:t>
             </a:fld>
             <a:endParaRPr lang="en-US"/>
           </a:p>
@@ -3983,7 +4067,7 @@
         </p:spPr>
         <p:txBody>
           <a:bodyPr>
-            <a:normAutofit lnSpcReduction="10000"/>
+            <a:normAutofit fontScale="92500" lnSpcReduction="20000"/>
           </a:bodyPr>
           <a:lstStyle/>
           <a:p>
@@ -4228,6 +4312,23 @@
               <a:t>coords</a:t>
             </a:r>
             <a:endParaRPr lang="en-US" dirty="0"/>
+          </a:p>
+          <a:p>
+            <a:pPr lvl="5"/>
+            <a:r>
+              <a:rPr lang="en-US" dirty="0"/>
+              <a:t>Repeat element to repeat objects with linearly varying parameters</a:t>
+            </a:r>
+          </a:p>
+          <a:p>
+            <a:r>
+              <a:rPr lang="en-US" dirty="0" err="1"/>
+              <a:t>OpenDRIVE</a:t>
+            </a:r>
+            <a:r>
+              <a:rPr lang="en-US" dirty="0"/>
+              <a:t> 2.0 will break almost everything that depends on these definitions!!!</a:t>
+            </a:r>
           </a:p>
         </p:txBody>
       </p:sp>
@@ -4488,6 +4589,19 @@
           <a:p>
             <a:r>
               <a:rPr lang="en-US" dirty="0"/>
+              <a:t>Cell arrays are used anywhere multiple elements exist at a level</a:t>
+            </a:r>
+          </a:p>
+          <a:p>
+            <a:pPr lvl="1"/>
+            <a:r>
+              <a:rPr lang="en-US" dirty="0"/>
+              <a:t>Easy to iterate over the cell arrays (though requires loops)</a:t>
+            </a:r>
+          </a:p>
+          <a:p>
+            <a:r>
+              <a:rPr lang="en-US" dirty="0"/>
               <a:t>Easy to compute (X,Y) </a:t>
             </a:r>
             <a:r>
@@ -4615,7 +4729,7 @@
         </p:spPr>
         <p:txBody>
           <a:bodyPr>
-            <a:normAutofit/>
+            <a:normAutofit fontScale="92500" lnSpcReduction="10000"/>
           </a:bodyPr>
           <a:lstStyle/>
           <a:p>
@@ -4772,6 +4886,33 @@
                 </a:solidFill>
               </a:rPr>
               <a:t>()</a:t>
+            </a:r>
+          </a:p>
+          <a:p>
+            <a:r>
+              <a:rPr lang="en-US" dirty="0"/>
+              <a:t>Need a separate lookup table to correlate objects with road geometry segments</a:t>
+            </a:r>
+          </a:p>
+          <a:p>
+            <a:r>
+              <a:rPr lang="en-US" dirty="0"/>
+              <a:t>Objects do not have any built-in attributes for appearance (e.g. color)</a:t>
+            </a:r>
+          </a:p>
+          <a:p>
+            <a:pPr lvl="1"/>
+            <a:r>
+              <a:rPr lang="en-US" dirty="0"/>
+              <a:t>Can be stored in &lt;</a:t>
+            </a:r>
+            <a:r>
+              <a:rPr lang="en-US" dirty="0" err="1"/>
+              <a:t>userData</a:t>
+            </a:r>
+            <a:r>
+              <a:rPr lang="en-US" dirty="0"/>
+              <a:t>&gt; within the object elements</a:t>
             </a:r>
           </a:p>
         </p:txBody>

</xml_diff>

<commit_message>
FIX: bugfixes for importing and parsing the road examples
</commit_message>
<xml_diff>
--- a/Documents/OpenDRIVE-MATLAB.pptx
+++ b/Documents/OpenDRIVE-MATLAB.pptx
@@ -255,7 +255,7 @@
           <a:p>
             <a:fld id="{E25F55F3-6C47-6F44-AA6F-8C97BF80ABB6}" type="datetimeFigureOut">
               <a:rPr lang="en-US" smtClean="0"/>
-              <a:t>4/1/22</a:t>
+              <a:t>4/3/22</a:t>
             </a:fld>
             <a:endParaRPr lang="en-US"/>
           </a:p>
@@ -837,7 +837,7 @@
           <a:p>
             <a:fld id="{34B42132-7ACE-EE46-9408-A55182111835}" type="datetimeFigureOut">
               <a:rPr lang="en-US" smtClean="0"/>
-              <a:t>4/1/22</a:t>
+              <a:t>4/3/22</a:t>
             </a:fld>
             <a:endParaRPr lang="en-US"/>
           </a:p>
@@ -1035,7 +1035,7 @@
           <a:p>
             <a:fld id="{34B42132-7ACE-EE46-9408-A55182111835}" type="datetimeFigureOut">
               <a:rPr lang="en-US" smtClean="0"/>
-              <a:t>4/1/22</a:t>
+              <a:t>4/3/22</a:t>
             </a:fld>
             <a:endParaRPr lang="en-US"/>
           </a:p>
@@ -1243,7 +1243,7 @@
           <a:p>
             <a:fld id="{34B42132-7ACE-EE46-9408-A55182111835}" type="datetimeFigureOut">
               <a:rPr lang="en-US" smtClean="0"/>
-              <a:t>4/1/22</a:t>
+              <a:t>4/3/22</a:t>
             </a:fld>
             <a:endParaRPr lang="en-US"/>
           </a:p>
@@ -1441,7 +1441,7 @@
           <a:p>
             <a:fld id="{34B42132-7ACE-EE46-9408-A55182111835}" type="datetimeFigureOut">
               <a:rPr lang="en-US" smtClean="0"/>
-              <a:t>4/1/22</a:t>
+              <a:t>4/3/22</a:t>
             </a:fld>
             <a:endParaRPr lang="en-US"/>
           </a:p>
@@ -1716,7 +1716,7 @@
           <a:p>
             <a:fld id="{34B42132-7ACE-EE46-9408-A55182111835}" type="datetimeFigureOut">
               <a:rPr lang="en-US" smtClean="0"/>
-              <a:t>4/1/22</a:t>
+              <a:t>4/3/22</a:t>
             </a:fld>
             <a:endParaRPr lang="en-US"/>
           </a:p>
@@ -1981,7 +1981,7 @@
           <a:p>
             <a:fld id="{34B42132-7ACE-EE46-9408-A55182111835}" type="datetimeFigureOut">
               <a:rPr lang="en-US" smtClean="0"/>
-              <a:t>4/1/22</a:t>
+              <a:t>4/3/22</a:t>
             </a:fld>
             <a:endParaRPr lang="en-US"/>
           </a:p>
@@ -2393,7 +2393,7 @@
           <a:p>
             <a:fld id="{34B42132-7ACE-EE46-9408-A55182111835}" type="datetimeFigureOut">
               <a:rPr lang="en-US" smtClean="0"/>
-              <a:t>4/1/22</a:t>
+              <a:t>4/3/22</a:t>
             </a:fld>
             <a:endParaRPr lang="en-US"/>
           </a:p>
@@ -2534,7 +2534,7 @@
           <a:p>
             <a:fld id="{34B42132-7ACE-EE46-9408-A55182111835}" type="datetimeFigureOut">
               <a:rPr lang="en-US" smtClean="0"/>
-              <a:t>4/1/22</a:t>
+              <a:t>4/3/22</a:t>
             </a:fld>
             <a:endParaRPr lang="en-US"/>
           </a:p>
@@ -2647,7 +2647,7 @@
           <a:p>
             <a:fld id="{34B42132-7ACE-EE46-9408-A55182111835}" type="datetimeFigureOut">
               <a:rPr lang="en-US" smtClean="0"/>
-              <a:t>4/1/22</a:t>
+              <a:t>4/3/22</a:t>
             </a:fld>
             <a:endParaRPr lang="en-US"/>
           </a:p>
@@ -2958,7 +2958,7 @@
           <a:p>
             <a:fld id="{34B42132-7ACE-EE46-9408-A55182111835}" type="datetimeFigureOut">
               <a:rPr lang="en-US" smtClean="0"/>
-              <a:t>4/1/22</a:t>
+              <a:t>4/3/22</a:t>
             </a:fld>
             <a:endParaRPr lang="en-US"/>
           </a:p>
@@ -3246,7 +3246,7 @@
           <a:p>
             <a:fld id="{34B42132-7ACE-EE46-9408-A55182111835}" type="datetimeFigureOut">
               <a:rPr lang="en-US" smtClean="0"/>
-              <a:t>4/1/22</a:t>
+              <a:t>4/3/22</a:t>
             </a:fld>
             <a:endParaRPr lang="en-US"/>
           </a:p>
@@ -3487,7 +3487,7 @@
           <a:p>
             <a:fld id="{34B42132-7ACE-EE46-9408-A55182111835}" type="datetimeFigureOut">
               <a:rPr lang="en-US" smtClean="0"/>
-              <a:t>4/1/22</a:t>
+              <a:t>4/3/22</a:t>
             </a:fld>
             <a:endParaRPr lang="en-US"/>
           </a:p>
@@ -3890,6 +3890,21 @@
 <file path=ppt/slides/slide1.xml><?xml version="1.0" encoding="utf-8"?>
 <p:sld xmlns:a="http://schemas.openxmlformats.org/drawingml/2006/main" xmlns:r="http://schemas.openxmlformats.org/officeDocument/2006/relationships" xmlns:p="http://schemas.openxmlformats.org/presentationml/2006/main">
   <p:cSld>
+    <p:bg>
+      <p:bgPr>
+        <a:blipFill dpi="0" rotWithShape="1">
+          <a:blip r:embed="rId2">
+            <a:alphaModFix amt="64949"/>
+            <a:lum/>
+          </a:blip>
+          <a:srcRect/>
+          <a:stretch>
+            <a:fillRect t="-9000" b="-9000"/>
+          </a:stretch>
+        </a:blipFill>
+        <a:effectLst/>
+      </p:bgPr>
+    </p:bg>
     <p:spTree>
       <p:nvGrpSpPr>
         <p:cNvPr id="1" name=""/>
@@ -3920,18 +3935,35 @@
             <p:ph type="ctrTitle"/>
           </p:nvPr>
         </p:nvSpPr>
-        <p:spPr/>
-        <p:txBody>
-          <a:bodyPr/>
-          <a:lstStyle/>
-          <a:p>
-            <a:r>
-              <a:rPr lang="en-US" dirty="0" err="1"/>
+        <p:spPr>
+          <a:xfrm>
+            <a:off x="568960" y="121920"/>
+            <a:ext cx="11054080" cy="955040"/>
+          </a:xfrm>
+          <a:solidFill>
+            <a:schemeClr val="bg1">
+              <a:alpha val="65105"/>
+            </a:schemeClr>
+          </a:solidFill>
+          <a:effectLst>
+            <a:outerShdw blurRad="50800" dist="38100" dir="2700000" algn="tl" rotWithShape="0">
+              <a:prstClr val="black">
+                <a:alpha val="40000"/>
+              </a:prstClr>
+            </a:outerShdw>
+          </a:effectLst>
+        </p:spPr>
+        <p:txBody>
+          <a:bodyPr/>
+          <a:lstStyle/>
+          <a:p>
+            <a:r>
+              <a:rPr lang="en-US" b="1" dirty="0" err="1"/>
               <a:t>OpenDRIVE</a:t>
             </a:r>
             <a:r>
-              <a:rPr lang="en-US" dirty="0"/>
-              <a:t> XODR Maps -&gt; MATLAB</a:t>
+              <a:rPr lang="en-US" b="1" dirty="0"/>
+              <a:t> XODR Maps in MATLAB</a:t>
             </a:r>
           </a:p>
         </p:txBody>
@@ -3952,26 +3984,51 @@
             <p:ph type="subTitle" idx="1"/>
           </p:nvPr>
         </p:nvSpPr>
-        <p:spPr/>
-        <p:txBody>
-          <a:bodyPr/>
-          <a:lstStyle/>
-          <a:p>
-            <a:r>
-              <a:rPr lang="en-US" dirty="0"/>
+        <p:spPr>
+          <a:xfrm>
+            <a:off x="101600" y="5080318"/>
+            <a:ext cx="3616960" cy="1655762"/>
+          </a:xfrm>
+          <a:solidFill>
+            <a:schemeClr val="bg1">
+              <a:alpha val="65383"/>
+            </a:schemeClr>
+          </a:solidFill>
+          <a:effectLst>
+            <a:outerShdw blurRad="50800" dist="38100" dir="2700000" algn="tl" rotWithShape="0">
+              <a:prstClr val="black">
+                <a:alpha val="40000"/>
+              </a:prstClr>
+            </a:outerShdw>
+          </a:effectLst>
+        </p:spPr>
+        <p:txBody>
+          <a:bodyPr>
+            <a:normAutofit lnSpcReduction="10000"/>
+          </a:bodyPr>
+          <a:lstStyle/>
+          <a:p>
+            <a:r>
+              <a:rPr lang="en-US" b="1" dirty="0"/>
               <a:t>Prof. Craig Beal</a:t>
             </a:r>
           </a:p>
           <a:p>
             <a:r>
-              <a:rPr lang="en-US" dirty="0"/>
+              <a:rPr lang="en-US" b="1" dirty="0"/>
               <a:t>Bucknell University</a:t>
             </a:r>
           </a:p>
           <a:p>
             <a:r>
-              <a:rPr lang="en-US" dirty="0"/>
-              <a:t>3.25.22</a:t>
+              <a:rPr lang="en-US" b="1" dirty="0"/>
+              <a:t>Started: 3.25.22</a:t>
+            </a:r>
+          </a:p>
+          <a:p>
+            <a:r>
+              <a:rPr lang="en-US" b="1" dirty="0"/>
+              <a:t>Updated through: 4.3.22</a:t>
             </a:r>
           </a:p>
         </p:txBody>
@@ -4067,7 +4124,7 @@
         </p:spPr>
         <p:txBody>
           <a:bodyPr>
-            <a:normAutofit fontScale="92500" lnSpcReduction="20000"/>
+            <a:normAutofit fontScale="77500" lnSpcReduction="20000"/>
           </a:bodyPr>
           <a:lstStyle/>
           <a:p>
@@ -4227,6 +4284,65 @@
             <a:r>
               <a:rPr lang="en-US" dirty="0"/>
               <a:t>Parametric polynomial</a:t>
+            </a:r>
+          </a:p>
+          <a:p>
+            <a:pPr lvl="3"/>
+            <a:r>
+              <a:rPr lang="en-US" dirty="0"/>
+              <a:t>Lanes</a:t>
+            </a:r>
+          </a:p>
+          <a:p>
+            <a:pPr lvl="4"/>
+            <a:r>
+              <a:rPr lang="en-US" dirty="0"/>
+              <a:t>Lane Segment(multiple) -&gt; start point in s </a:t>
+            </a:r>
+            <a:r>
+              <a:rPr lang="en-US" dirty="0" err="1"/>
+              <a:t>coord</a:t>
+            </a:r>
+            <a:endParaRPr lang="en-US" dirty="0"/>
+          </a:p>
+          <a:p>
+            <a:pPr lvl="5"/>
+            <a:r>
+              <a:rPr lang="en-US" dirty="0"/>
+              <a:t>Left, Center, Right</a:t>
+            </a:r>
+          </a:p>
+          <a:p>
+            <a:pPr lvl="6"/>
+            <a:r>
+              <a:rPr lang="en-US" dirty="0"/>
+              <a:t>Lane (multiple)</a:t>
+            </a:r>
+          </a:p>
+          <a:p>
+            <a:pPr lvl="7"/>
+            <a:r>
+              <a:rPr lang="en-US" dirty="0"/>
+              <a:t>Width (multiple)-&gt; cubic polynomial form defining profile in </a:t>
+            </a:r>
+            <a:r>
+              <a:rPr lang="en-US" dirty="0" err="1"/>
+              <a:t>s,t</a:t>
+            </a:r>
+            <a:r>
+              <a:rPr lang="en-US" dirty="0"/>
+              <a:t> coordinates</a:t>
+            </a:r>
+          </a:p>
+          <a:p>
+            <a:pPr lvl="7"/>
+            <a:r>
+              <a:rPr lang="en-US" dirty="0" err="1"/>
+              <a:t>RoadMark</a:t>
+            </a:r>
+            <a:r>
+              <a:rPr lang="en-US" dirty="0"/>
+              <a:t> -&gt; </a:t>
             </a:r>
           </a:p>
           <a:p>

</xml_diff>

<commit_message>
DOC: Updated Readme file and description slides, shifted dependencies to match specified structure.
</commit_message>
<xml_diff>
--- a/Documents/OpenDRIVE-MATLAB.pptx
+++ b/Documents/OpenDRIVE-MATLAB.pptx
@@ -5,15 +5,16 @@
     <p:sldMasterId id="2147483648" r:id="rId1"/>
   </p:sldMasterIdLst>
   <p:notesMasterIdLst>
-    <p:notesMasterId r:id="rId8"/>
+    <p:notesMasterId r:id="rId9"/>
   </p:notesMasterIdLst>
   <p:sldIdLst>
     <p:sldId id="256" r:id="rId2"/>
-    <p:sldId id="257" r:id="rId3"/>
-    <p:sldId id="258" r:id="rId4"/>
-    <p:sldId id="259" r:id="rId5"/>
-    <p:sldId id="261" r:id="rId6"/>
-    <p:sldId id="260" r:id="rId7"/>
+    <p:sldId id="263" r:id="rId3"/>
+    <p:sldId id="257" r:id="rId4"/>
+    <p:sldId id="258" r:id="rId5"/>
+    <p:sldId id="259" r:id="rId6"/>
+    <p:sldId id="261" r:id="rId7"/>
+    <p:sldId id="262" r:id="rId8"/>
   </p:sldIdLst>
   <p:sldSz cx="12192000" cy="6858000"/>
   <p:notesSz cx="6858000" cy="9144000"/>
@@ -126,53 +127,6 @@
 </p188:authorLst>
 </file>
 
-<file path=ppt/comments/modernComment_104_BCA0CE27.xml><?xml version="1.0" encoding="utf-8"?>
-<p188:cmLst xmlns:a="http://schemas.openxmlformats.org/drawingml/2006/main" xmlns:r="http://schemas.openxmlformats.org/officeDocument/2006/relationships" xmlns:p188="http://schemas.microsoft.com/office/powerpoint/2018/8/main">
-  <p188:cm id="{625F0950-5837-8048-9D23-0DACB5BBD1D0}" authorId="{ADD8E620-39A0-6CB3-6466-AC854744F16C}" created="2022-03-25T21:14:08.904">
-    <ac:txMkLst xmlns:ac="http://schemas.microsoft.com/office/drawing/2013/main/command">
-      <pc:docMk xmlns:pc="http://schemas.microsoft.com/office/powerpoint/2013/main/command"/>
-      <pc:sldMk xmlns:pc="http://schemas.microsoft.com/office/powerpoint/2013/main/command" cId="3164655143" sldId="260"/>
-      <ac:spMk id="3" creationId="{F47E3397-DD83-5944-915F-B1C23D4146CB}"/>
-      <ac:txMk cp="451" len="71">
-        <ac:context len="686" hash="1500207409"/>
-      </ac:txMk>
-    </ac:txMkLst>
-    <p188:pos x="8367793" y="3180328"/>
-    <p188:txBody>
-      <a:bodyPr/>
-      <a:lstStyle/>
-      <a:p>
-        <a:r>
-          <a:rPr lang="en-US"/>
-          <a:t>Should these circular patch objects be represented by a set of points in addition to the primitive? If so, how dense should the points be?</a:t>
-        </a:r>
-      </a:p>
-    </p188:txBody>
-  </p188:cm>
-  <p188:cm id="{5DFED73E-1F5F-844B-A495-66EB21FE938C}" authorId="{ADD8E620-39A0-6CB3-6466-AC854744F16C}" created="2022-03-25T21:14:45.539">
-    <ac:txMkLst xmlns:ac="http://schemas.microsoft.com/office/drawing/2013/main/command">
-      <pc:docMk xmlns:pc="http://schemas.microsoft.com/office/powerpoint/2013/main/command"/>
-      <pc:sldMk xmlns:pc="http://schemas.microsoft.com/office/powerpoint/2013/main/command" cId="3164655143" sldId="260"/>
-      <ac:spMk id="3" creationId="{F47E3397-DD83-5944-915F-B1C23D4146CB}"/>
-      <ac:txMk cp="523" len="91">
-        <ac:context len="686" hash="1500207409"/>
-      </ac:txMk>
-    </ac:txMkLst>
-    <p188:pos x="10522058" y="3505792"/>
-    <p188:txBody>
-      <a:bodyPr/>
-      <a:lstStyle/>
-      <a:p>
-        <a:r>
-          <a:rPr lang="en-US"/>
-          <a:t>Should these rectangular patch objects be represented by a set of points in addition to the primitive? If so, how dense should the points be?</a:t>
-        </a:r>
-      </a:p>
-    </p188:txBody>
-  </p188:cm>
-</p188:cmLst>
-</file>
-
 <file path=ppt/notesMasters/notesMaster1.xml><?xml version="1.0" encoding="utf-8"?>
 <p:notesMaster xmlns:a="http://schemas.openxmlformats.org/drawingml/2006/main" xmlns:r="http://schemas.openxmlformats.org/officeDocument/2006/relationships" xmlns:p="http://schemas.openxmlformats.org/presentationml/2006/main">
   <p:cSld>
@@ -255,7 +209,7 @@
           <a:p>
             <a:fld id="{E25F55F3-6C47-6F44-AA6F-8C97BF80ABB6}" type="datetimeFigureOut">
               <a:rPr lang="en-US" smtClean="0"/>
-              <a:t>4/3/22</a:t>
+              <a:t>4/29/22</a:t>
             </a:fld>
             <a:endParaRPr lang="en-US"/>
           </a:p>
@@ -587,7 +541,7 @@
           <a:p>
             <a:fld id="{BEEFB87A-38AE-FD43-80BF-6BA280226820}" type="slidenum">
               <a:rPr lang="en-US" smtClean="0"/>
-              <a:t>2</a:t>
+              <a:t>3</a:t>
             </a:fld>
             <a:endParaRPr lang="en-US"/>
           </a:p>
@@ -597,90 +551,6 @@
     <p:extLst>
       <p:ext uri="{BB962C8B-B14F-4D97-AF65-F5344CB8AC3E}">
         <p14:creationId xmlns:p14="http://schemas.microsoft.com/office/powerpoint/2010/main" val="45817430"/>
-      </p:ext>
-    </p:extLst>
-  </p:cSld>
-  <p:clrMapOvr>
-    <a:masterClrMapping/>
-  </p:clrMapOvr>
-</p:notes>
-</file>
-
-<file path=ppt/notesSlides/notesSlide2.xml><?xml version="1.0" encoding="utf-8"?>
-<p:notes xmlns:a="http://schemas.openxmlformats.org/drawingml/2006/main" xmlns:r="http://schemas.openxmlformats.org/officeDocument/2006/relationships" xmlns:p="http://schemas.openxmlformats.org/presentationml/2006/main">
-  <p:cSld>
-    <p:spTree>
-      <p:nvGrpSpPr>
-        <p:cNvPr id="1" name=""/>
-        <p:cNvGrpSpPr/>
-        <p:nvPr/>
-      </p:nvGrpSpPr>
-      <p:grpSpPr>
-        <a:xfrm>
-          <a:off x="0" y="0"/>
-          <a:ext cx="0" cy="0"/>
-          <a:chOff x="0" y="0"/>
-          <a:chExt cx="0" cy="0"/>
-        </a:xfrm>
-      </p:grpSpPr>
-      <p:sp>
-        <p:nvSpPr>
-          <p:cNvPr id="2" name="Slide Image Placeholder 1"/>
-          <p:cNvSpPr>
-            <a:spLocks noGrp="1" noRot="1" noChangeAspect="1"/>
-          </p:cNvSpPr>
-          <p:nvPr>
-            <p:ph type="sldImg"/>
-          </p:nvPr>
-        </p:nvSpPr>
-        <p:spPr/>
-      </p:sp>
-      <p:sp>
-        <p:nvSpPr>
-          <p:cNvPr id="3" name="Notes Placeholder 2"/>
-          <p:cNvSpPr>
-            <a:spLocks noGrp="1"/>
-          </p:cNvSpPr>
-          <p:nvPr>
-            <p:ph type="body" idx="1"/>
-          </p:nvPr>
-        </p:nvSpPr>
-        <p:spPr/>
-        <p:txBody>
-          <a:bodyPr/>
-          <a:lstStyle/>
-          <a:p>
-            <a:endParaRPr lang="en-US" dirty="0"/>
-          </a:p>
-        </p:txBody>
-      </p:sp>
-      <p:sp>
-        <p:nvSpPr>
-          <p:cNvPr id="4" name="Slide Number Placeholder 3"/>
-          <p:cNvSpPr>
-            <a:spLocks noGrp="1"/>
-          </p:cNvSpPr>
-          <p:nvPr>
-            <p:ph type="sldNum" sz="quarter" idx="5"/>
-          </p:nvPr>
-        </p:nvSpPr>
-        <p:spPr/>
-        <p:txBody>
-          <a:bodyPr/>
-          <a:lstStyle/>
-          <a:p>
-            <a:fld id="{BEEFB87A-38AE-FD43-80BF-6BA280226820}" type="slidenum">
-              <a:rPr lang="en-US" smtClean="0"/>
-              <a:t>6</a:t>
-            </a:fld>
-            <a:endParaRPr lang="en-US"/>
-          </a:p>
-        </p:txBody>
-      </p:sp>
-    </p:spTree>
-    <p:extLst>
-      <p:ext uri="{BB962C8B-B14F-4D97-AF65-F5344CB8AC3E}">
-        <p14:creationId xmlns:p14="http://schemas.microsoft.com/office/powerpoint/2010/main" val="3679194286"/>
       </p:ext>
     </p:extLst>
   </p:cSld>
@@ -837,7 +707,7 @@
           <a:p>
             <a:fld id="{34B42132-7ACE-EE46-9408-A55182111835}" type="datetimeFigureOut">
               <a:rPr lang="en-US" smtClean="0"/>
-              <a:t>4/3/22</a:t>
+              <a:t>4/29/22</a:t>
             </a:fld>
             <a:endParaRPr lang="en-US"/>
           </a:p>
@@ -1035,7 +905,7 @@
           <a:p>
             <a:fld id="{34B42132-7ACE-EE46-9408-A55182111835}" type="datetimeFigureOut">
               <a:rPr lang="en-US" smtClean="0"/>
-              <a:t>4/3/22</a:t>
+              <a:t>4/29/22</a:t>
             </a:fld>
             <a:endParaRPr lang="en-US"/>
           </a:p>
@@ -1243,7 +1113,7 @@
           <a:p>
             <a:fld id="{34B42132-7ACE-EE46-9408-A55182111835}" type="datetimeFigureOut">
               <a:rPr lang="en-US" smtClean="0"/>
-              <a:t>4/3/22</a:t>
+              <a:t>4/29/22</a:t>
             </a:fld>
             <a:endParaRPr lang="en-US"/>
           </a:p>
@@ -1441,7 +1311,7 @@
           <a:p>
             <a:fld id="{34B42132-7ACE-EE46-9408-A55182111835}" type="datetimeFigureOut">
               <a:rPr lang="en-US" smtClean="0"/>
-              <a:t>4/3/22</a:t>
+              <a:t>4/29/22</a:t>
             </a:fld>
             <a:endParaRPr lang="en-US"/>
           </a:p>
@@ -1716,7 +1586,7 @@
           <a:p>
             <a:fld id="{34B42132-7ACE-EE46-9408-A55182111835}" type="datetimeFigureOut">
               <a:rPr lang="en-US" smtClean="0"/>
-              <a:t>4/3/22</a:t>
+              <a:t>4/29/22</a:t>
             </a:fld>
             <a:endParaRPr lang="en-US"/>
           </a:p>
@@ -1981,7 +1851,7 @@
           <a:p>
             <a:fld id="{34B42132-7ACE-EE46-9408-A55182111835}" type="datetimeFigureOut">
               <a:rPr lang="en-US" smtClean="0"/>
-              <a:t>4/3/22</a:t>
+              <a:t>4/29/22</a:t>
             </a:fld>
             <a:endParaRPr lang="en-US"/>
           </a:p>
@@ -2393,7 +2263,7 @@
           <a:p>
             <a:fld id="{34B42132-7ACE-EE46-9408-A55182111835}" type="datetimeFigureOut">
               <a:rPr lang="en-US" smtClean="0"/>
-              <a:t>4/3/22</a:t>
+              <a:t>4/29/22</a:t>
             </a:fld>
             <a:endParaRPr lang="en-US"/>
           </a:p>
@@ -2534,7 +2404,7 @@
           <a:p>
             <a:fld id="{34B42132-7ACE-EE46-9408-A55182111835}" type="datetimeFigureOut">
               <a:rPr lang="en-US" smtClean="0"/>
-              <a:t>4/3/22</a:t>
+              <a:t>4/29/22</a:t>
             </a:fld>
             <a:endParaRPr lang="en-US"/>
           </a:p>
@@ -2647,7 +2517,7 @@
           <a:p>
             <a:fld id="{34B42132-7ACE-EE46-9408-A55182111835}" type="datetimeFigureOut">
               <a:rPr lang="en-US" smtClean="0"/>
-              <a:t>4/3/22</a:t>
+              <a:t>4/29/22</a:t>
             </a:fld>
             <a:endParaRPr lang="en-US"/>
           </a:p>
@@ -2958,7 +2828,7 @@
           <a:p>
             <a:fld id="{34B42132-7ACE-EE46-9408-A55182111835}" type="datetimeFigureOut">
               <a:rPr lang="en-US" smtClean="0"/>
-              <a:t>4/3/22</a:t>
+              <a:t>4/29/22</a:t>
             </a:fld>
             <a:endParaRPr lang="en-US"/>
           </a:p>
@@ -3246,7 +3116,7 @@
           <a:p>
             <a:fld id="{34B42132-7ACE-EE46-9408-A55182111835}" type="datetimeFigureOut">
               <a:rPr lang="en-US" smtClean="0"/>
-              <a:t>4/3/22</a:t>
+              <a:t>4/29/22</a:t>
             </a:fld>
             <a:endParaRPr lang="en-US"/>
           </a:p>
@@ -3487,7 +3357,7 @@
           <a:p>
             <a:fld id="{34B42132-7ACE-EE46-9408-A55182111835}" type="datetimeFigureOut">
               <a:rPr lang="en-US" smtClean="0"/>
-              <a:t>4/3/22</a:t>
+              <a:t>4/29/22</a:t>
             </a:fld>
             <a:endParaRPr lang="en-US"/>
           </a:p>
@@ -4065,10 +3935,10 @@
       </p:grpSpPr>
       <p:sp>
         <p:nvSpPr>
-          <p:cNvPr id="2" name="Title 1">
-            <a:extLst>
-              <a:ext uri="{FF2B5EF4-FFF2-40B4-BE49-F238E27FC236}">
-                <a16:creationId xmlns:a16="http://schemas.microsoft.com/office/drawing/2014/main" id="{7F942987-35F8-5749-85AF-3BE0AB19C5D9}"/>
+          <p:cNvPr id="4" name="Title 3">
+            <a:extLst>
+              <a:ext uri="{FF2B5EF4-FFF2-40B4-BE49-F238E27FC236}">
+                <a16:creationId xmlns:a16="http://schemas.microsoft.com/office/drawing/2014/main" id="{80A76C44-6DF3-B846-ABC0-4897036B18B8}"/>
               </a:ext>
             </a:extLst>
           </p:cNvPr>
@@ -4079,12 +3949,7 @@
             <p:ph type="title"/>
           </p:nvPr>
         </p:nvSpPr>
-        <p:spPr>
-          <a:xfrm>
-            <a:off x="0" y="18255"/>
-            <a:ext cx="10515600" cy="1325563"/>
-          </a:xfrm>
-        </p:spPr>
+        <p:spPr/>
         <p:txBody>
           <a:bodyPr/>
           <a:lstStyle/>
@@ -4095,355 +3960,35 @@
             </a:r>
             <a:r>
               <a:rPr lang="en-US" dirty="0"/>
-              <a:t> XODR</a:t>
-            </a:r>
-          </a:p>
-        </p:txBody>
-      </p:sp>
-      <p:sp>
-        <p:nvSpPr>
-          <p:cNvPr id="3" name="Content Placeholder 2">
-            <a:extLst>
-              <a:ext uri="{FF2B5EF4-FFF2-40B4-BE49-F238E27FC236}">
-                <a16:creationId xmlns:a16="http://schemas.microsoft.com/office/drawing/2014/main" id="{EF6B37A4-6B34-664D-B338-6337F25130BA}"/>
-              </a:ext>
-            </a:extLst>
-          </p:cNvPr>
-          <p:cNvSpPr>
-            <a:spLocks noGrp="1"/>
-          </p:cNvSpPr>
-          <p:nvPr>
-            <p:ph idx="1"/>
-          </p:nvPr>
-        </p:nvSpPr>
-        <p:spPr>
-          <a:xfrm>
-            <a:off x="0" y="1343817"/>
-            <a:ext cx="12192000" cy="5495927"/>
-          </a:xfrm>
-        </p:spPr>
-        <p:txBody>
-          <a:bodyPr>
-            <a:normAutofit fontScale="77500" lnSpcReduction="20000"/>
-          </a:bodyPr>
-          <a:lstStyle/>
-          <a:p>
-            <a:r>
-              <a:rPr lang="en-US" dirty="0"/>
-              <a:t>Roads are defined in a hierarchical XML format</a:t>
-            </a:r>
-          </a:p>
-          <a:p>
-            <a:pPr lvl="1"/>
-            <a:r>
-              <a:rPr lang="en-US" dirty="0" err="1"/>
-              <a:t>OpenDRIVE</a:t>
-            </a:r>
-            <a:endParaRPr lang="en-US" dirty="0"/>
-          </a:p>
-          <a:p>
-            <a:pPr lvl="2"/>
-            <a:r>
-              <a:rPr lang="en-US" dirty="0"/>
-              <a:t>Header </a:t>
-            </a:r>
-            <a:r>
-              <a:rPr lang="en-US" dirty="0">
-                <a:sym typeface="Wingdings" pitchFamily="2" charset="2"/>
-              </a:rPr>
-              <a:t> bounding box defined by west, east, south, north limit values</a:t>
-            </a:r>
-            <a:endParaRPr lang="en-US" dirty="0"/>
-          </a:p>
-          <a:p>
-            <a:pPr lvl="2"/>
-            <a:r>
-              <a:rPr lang="en-US" dirty="0"/>
-              <a:t>Roads (multiple)</a:t>
-            </a:r>
-          </a:p>
-          <a:p>
-            <a:pPr lvl="3"/>
-            <a:r>
-              <a:rPr lang="en-US" dirty="0"/>
-              <a:t>Planview</a:t>
-            </a:r>
-          </a:p>
-          <a:p>
-            <a:pPr lvl="4"/>
-            <a:r>
-              <a:rPr lang="en-US" dirty="0"/>
-              <a:t>Geometry (multiple)</a:t>
-            </a:r>
-          </a:p>
-          <a:p>
-            <a:pPr lvl="5"/>
-            <a:r>
-              <a:rPr lang="en-US" dirty="0"/>
-              <a:t>Line </a:t>
-            </a:r>
-            <a:r>
-              <a:rPr lang="en-US" dirty="0">
-                <a:sym typeface="Wingdings" pitchFamily="2" charset="2"/>
-              </a:rPr>
-              <a:t></a:t>
-            </a:r>
-            <a:r>
-              <a:rPr lang="en-US" dirty="0"/>
-              <a:t> start point in E,N </a:t>
-            </a:r>
-            <a:r>
-              <a:rPr lang="en-US" dirty="0" err="1"/>
-              <a:t>coords</a:t>
-            </a:r>
-            <a:r>
-              <a:rPr lang="en-US" dirty="0"/>
-              <a:t>, start point in s </a:t>
-            </a:r>
-            <a:r>
-              <a:rPr lang="en-US" dirty="0" err="1"/>
-              <a:t>coord</a:t>
-            </a:r>
-            <a:r>
-              <a:rPr lang="en-US" dirty="0"/>
-              <a:t>, heading, length</a:t>
-            </a:r>
-          </a:p>
-          <a:p>
-            <a:pPr lvl="5"/>
-            <a:r>
-              <a:rPr lang="en-US" dirty="0"/>
-              <a:t>Arc </a:t>
-            </a:r>
-            <a:r>
-              <a:rPr lang="en-US" dirty="0">
-                <a:sym typeface="Wingdings" pitchFamily="2" charset="2"/>
-              </a:rPr>
-              <a:t></a:t>
-            </a:r>
-            <a:r>
-              <a:rPr lang="en-US" dirty="0"/>
-              <a:t> start point in E,N </a:t>
-            </a:r>
-            <a:r>
-              <a:rPr lang="en-US" dirty="0" err="1"/>
-              <a:t>coords</a:t>
-            </a:r>
-            <a:r>
-              <a:rPr lang="en-US" dirty="0"/>
-              <a:t>, start point in s </a:t>
-            </a:r>
-            <a:r>
-              <a:rPr lang="en-US" dirty="0" err="1"/>
-              <a:t>coord</a:t>
-            </a:r>
-            <a:r>
-              <a:rPr lang="en-US" dirty="0"/>
-              <a:t>, initial heading, length, curvature</a:t>
-            </a:r>
-          </a:p>
-          <a:p>
-            <a:pPr lvl="5"/>
-            <a:r>
-              <a:rPr lang="en-US" dirty="0"/>
-              <a:t>Spiral </a:t>
-            </a:r>
-            <a:r>
-              <a:rPr lang="en-US" dirty="0">
-                <a:sym typeface="Wingdings" pitchFamily="2" charset="2"/>
-              </a:rPr>
-              <a:t> start point in E,N </a:t>
-            </a:r>
-            <a:r>
-              <a:rPr lang="en-US" dirty="0" err="1">
-                <a:sym typeface="Wingdings" pitchFamily="2" charset="2"/>
-              </a:rPr>
-              <a:t>coords</a:t>
-            </a:r>
-            <a:r>
-              <a:rPr lang="en-US" dirty="0">
-                <a:sym typeface="Wingdings" pitchFamily="2" charset="2"/>
-              </a:rPr>
-              <a:t>, start point in s </a:t>
-            </a:r>
-            <a:r>
-              <a:rPr lang="en-US" dirty="0" err="1">
-                <a:sym typeface="Wingdings" pitchFamily="2" charset="2"/>
-              </a:rPr>
-              <a:t>coord</a:t>
-            </a:r>
-            <a:r>
-              <a:rPr lang="en-US" dirty="0">
-                <a:sym typeface="Wingdings" pitchFamily="2" charset="2"/>
-              </a:rPr>
-              <a:t>, initial heading, length, initial curvature, ending curvature</a:t>
-            </a:r>
-          </a:p>
-          <a:p>
-            <a:pPr lvl="5"/>
-            <a:r>
-              <a:rPr lang="en-US" dirty="0"/>
-              <a:t>Parametric polynomial</a:t>
-            </a:r>
-          </a:p>
-          <a:p>
-            <a:pPr lvl="3"/>
-            <a:r>
-              <a:rPr lang="en-US" dirty="0"/>
-              <a:t>Lanes</a:t>
-            </a:r>
-          </a:p>
-          <a:p>
-            <a:pPr lvl="4"/>
-            <a:r>
-              <a:rPr lang="en-US" dirty="0"/>
-              <a:t>Lane Segment(multiple) -&gt; start point in s </a:t>
-            </a:r>
-            <a:r>
-              <a:rPr lang="en-US" dirty="0" err="1"/>
-              <a:t>coord</a:t>
-            </a:r>
-            <a:endParaRPr lang="en-US" dirty="0"/>
-          </a:p>
-          <a:p>
-            <a:pPr lvl="5"/>
-            <a:r>
-              <a:rPr lang="en-US" dirty="0"/>
-              <a:t>Left, Center, Right</a:t>
-            </a:r>
-          </a:p>
-          <a:p>
-            <a:pPr lvl="6"/>
-            <a:r>
-              <a:rPr lang="en-US" dirty="0"/>
-              <a:t>Lane (multiple)</a:t>
-            </a:r>
-          </a:p>
-          <a:p>
-            <a:pPr lvl="7"/>
-            <a:r>
-              <a:rPr lang="en-US" dirty="0"/>
-              <a:t>Width (multiple)-&gt; cubic polynomial form defining profile in </a:t>
-            </a:r>
-            <a:r>
-              <a:rPr lang="en-US" dirty="0" err="1"/>
-              <a:t>s,t</a:t>
-            </a:r>
-            <a:r>
-              <a:rPr lang="en-US" dirty="0"/>
-              <a:t> coordinates</a:t>
-            </a:r>
-          </a:p>
-          <a:p>
-            <a:pPr lvl="7"/>
-            <a:r>
-              <a:rPr lang="en-US" dirty="0" err="1"/>
-              <a:t>RoadMark</a:t>
-            </a:r>
-            <a:r>
-              <a:rPr lang="en-US" dirty="0"/>
-              <a:t> -&gt; </a:t>
-            </a:r>
-          </a:p>
-          <a:p>
-            <a:pPr lvl="3"/>
-            <a:r>
-              <a:rPr lang="en-US" dirty="0"/>
-              <a:t>Objects</a:t>
-            </a:r>
-          </a:p>
-          <a:p>
-            <a:pPr lvl="4"/>
-            <a:r>
-              <a:rPr lang="en-US" dirty="0"/>
-              <a:t>Object (multiple)</a:t>
-            </a:r>
-          </a:p>
-          <a:p>
-            <a:pPr lvl="5"/>
-            <a:r>
-              <a:rPr lang="en-US" dirty="0"/>
-              <a:t>Location of object origin in S,T </a:t>
-            </a:r>
-            <a:r>
-              <a:rPr lang="en-US" dirty="0" err="1"/>
-              <a:t>coords</a:t>
-            </a:r>
-            <a:endParaRPr lang="en-US" dirty="0"/>
-          </a:p>
-          <a:p>
-            <a:pPr lvl="5"/>
-            <a:r>
-              <a:rPr lang="en-US" dirty="0"/>
-              <a:t>Bounding box (length, width or radius of circle in </a:t>
-            </a:r>
-            <a:r>
-              <a:rPr lang="en-US" dirty="0" err="1"/>
-              <a:t>u,v</a:t>
-            </a:r>
-            <a:r>
-              <a:rPr lang="en-US" dirty="0"/>
-              <a:t> </a:t>
-            </a:r>
-            <a:r>
-              <a:rPr lang="en-US" dirty="0" err="1"/>
-              <a:t>coords</a:t>
-            </a:r>
-            <a:r>
-              <a:rPr lang="en-US" dirty="0"/>
-              <a:t>)</a:t>
-            </a:r>
-          </a:p>
-          <a:p>
-            <a:pPr lvl="5"/>
-            <a:r>
-              <a:rPr lang="en-US" dirty="0"/>
-              <a:t>Outline</a:t>
-            </a:r>
-          </a:p>
-          <a:p>
-            <a:pPr lvl="6"/>
-            <a:r>
-              <a:rPr lang="en-US" dirty="0"/>
-              <a:t>Corners in S,T </a:t>
-            </a:r>
-            <a:r>
-              <a:rPr lang="en-US" dirty="0" err="1"/>
-              <a:t>coords</a:t>
-            </a:r>
-            <a:r>
-              <a:rPr lang="en-US" dirty="0"/>
-              <a:t> or local </a:t>
-            </a:r>
-            <a:r>
-              <a:rPr lang="en-US" dirty="0" err="1"/>
-              <a:t>u,v</a:t>
-            </a:r>
-            <a:r>
-              <a:rPr lang="en-US" dirty="0"/>
-              <a:t> </a:t>
-            </a:r>
-            <a:r>
-              <a:rPr lang="en-US" dirty="0" err="1"/>
-              <a:t>coords</a:t>
-            </a:r>
-            <a:endParaRPr lang="en-US" dirty="0"/>
-          </a:p>
-          <a:p>
-            <a:pPr lvl="5"/>
-            <a:r>
-              <a:rPr lang="en-US" dirty="0"/>
-              <a:t>Repeat element to repeat objects with linearly varying parameters</a:t>
-            </a:r>
-          </a:p>
-          <a:p>
-            <a:r>
-              <a:rPr lang="en-US" dirty="0" err="1"/>
-              <a:t>OpenDRIVE</a:t>
-            </a:r>
-            <a:r>
-              <a:rPr lang="en-US" dirty="0"/>
-              <a:t> 2.0 will break almost everything that depends on these definitions!!!</a:t>
+              <a:t> XODR file basics</a:t>
+            </a:r>
+          </a:p>
+        </p:txBody>
+      </p:sp>
+      <p:sp>
+        <p:nvSpPr>
+          <p:cNvPr id="5" name="Text Placeholder 4">
+            <a:extLst>
+              <a:ext uri="{FF2B5EF4-FFF2-40B4-BE49-F238E27FC236}">
+                <a16:creationId xmlns:a16="http://schemas.microsoft.com/office/drawing/2014/main" id="{E31E01B4-7438-2A4D-8B94-F04895E4EB15}"/>
+              </a:ext>
+            </a:extLst>
+          </p:cNvPr>
+          <p:cNvSpPr>
+            <a:spLocks noGrp="1"/>
+          </p:cNvSpPr>
+          <p:nvPr>
+            <p:ph type="body" idx="1"/>
+          </p:nvPr>
+        </p:nvSpPr>
+        <p:spPr/>
+        <p:txBody>
+          <a:bodyPr/>
+          <a:lstStyle/>
+          <a:p>
+            <a:r>
+              <a:rPr lang="en-US" dirty="0"/>
+              <a:t>As applicable for import into MATLAB for plotting/analysis</a:t>
             </a:r>
           </a:p>
         </p:txBody>
@@ -4451,7 +3996,7 @@
     </p:spTree>
     <p:extLst>
       <p:ext uri="{BB962C8B-B14F-4D97-AF65-F5344CB8AC3E}">
-        <p14:creationId xmlns:p14="http://schemas.microsoft.com/office/powerpoint/2010/main" val="2353100100"/>
+        <p14:creationId xmlns:p14="http://schemas.microsoft.com/office/powerpoint/2010/main" val="968809613"/>
       </p:ext>
     </p:extLst>
   </p:cSld>
@@ -4483,7 +4028,7 @@
           <p:cNvPr id="2" name="Title 1">
             <a:extLst>
               <a:ext uri="{FF2B5EF4-FFF2-40B4-BE49-F238E27FC236}">
-                <a16:creationId xmlns:a16="http://schemas.microsoft.com/office/drawing/2014/main" id="{F2C5B6FB-CA95-BA47-A2EC-C987EC6D56B7}"/>
+                <a16:creationId xmlns:a16="http://schemas.microsoft.com/office/drawing/2014/main" id="{7F942987-35F8-5749-85AF-3BE0AB19C5D9}"/>
               </a:ext>
             </a:extLst>
           </p:cNvPr>
@@ -4510,7 +4055,7 @@
             </a:r>
             <a:r>
               <a:rPr lang="en-US" dirty="0"/>
-              <a:t> -&gt; MATLAB</a:t>
+              <a:t> XODR</a:t>
             </a:r>
           </a:p>
         </p:txBody>
@@ -4520,7 +4065,7 @@
           <p:cNvPr id="3" name="Content Placeholder 2">
             <a:extLst>
               <a:ext uri="{FF2B5EF4-FFF2-40B4-BE49-F238E27FC236}">
-                <a16:creationId xmlns:a16="http://schemas.microsoft.com/office/drawing/2014/main" id="{BA6B05A8-E34C-5546-A3CE-EF0F6C979B90}"/>
+                <a16:creationId xmlns:a16="http://schemas.microsoft.com/office/drawing/2014/main" id="{EF6B37A4-6B34-664D-B338-6337F25130BA}"/>
               </a:ext>
             </a:extLst>
           </p:cNvPr>
@@ -4533,75 +4078,332 @@
         </p:nvSpPr>
         <p:spPr>
           <a:xfrm>
-            <a:off x="0" y="1343818"/>
+            <a:off x="0" y="1092805"/>
             <a:ext cx="12192000" cy="5495927"/>
           </a:xfrm>
         </p:spPr>
         <p:txBody>
-          <a:bodyPr/>
-          <a:lstStyle/>
-          <a:p>
-            <a:r>
-              <a:rPr lang="en-US" dirty="0"/>
-              <a:t>Importing </a:t>
-            </a:r>
+          <a:bodyPr>
+            <a:normAutofit fontScale="77500" lnSpcReduction="20000"/>
+          </a:bodyPr>
+          <a:lstStyle/>
+          <a:p>
+            <a:r>
+              <a:rPr lang="en-US" dirty="0"/>
+              <a:t>Roads are defined in a hierarchical XML format</a:t>
+            </a:r>
+          </a:p>
+          <a:p>
+            <a:pPr lvl="1"/>
             <a:r>
               <a:rPr lang="en-US" dirty="0" err="1"/>
               <a:t>OpenDRIVE</a:t>
             </a:r>
-            <a:r>
-              <a:rPr lang="en-US" dirty="0"/>
-              <a:t> data to MATLAB is fairly straightforward</a:t>
-            </a:r>
-          </a:p>
-          <a:p>
-            <a:pPr lvl="1"/>
-            <a:r>
-              <a:rPr lang="en-US" dirty="0"/>
-              <a:t>There exist several xml2struct tools that can convert the XML into a MATLAB structure that preserves the hierarchy of the </a:t>
-            </a:r>
+            <a:endParaRPr lang="en-US" dirty="0"/>
+          </a:p>
+          <a:p>
+            <a:pPr lvl="2"/>
+            <a:r>
+              <a:rPr lang="en-US" dirty="0"/>
+              <a:t>Header </a:t>
+            </a:r>
+            <a:r>
+              <a:rPr lang="en-US" dirty="0">
+                <a:sym typeface="Wingdings" pitchFamily="2" charset="2"/>
+              </a:rPr>
+              <a:t> bounding box defined by west, east, south, north limit values</a:t>
+            </a:r>
+            <a:endParaRPr lang="en-US" dirty="0"/>
+          </a:p>
+          <a:p>
+            <a:pPr lvl="2"/>
+            <a:r>
+              <a:rPr lang="en-US" dirty="0"/>
+              <a:t>Roads (multiple)</a:t>
+            </a:r>
+          </a:p>
+          <a:p>
+            <a:pPr lvl="3"/>
+            <a:r>
+              <a:rPr lang="en-US" dirty="0"/>
+              <a:t>Planview</a:t>
+            </a:r>
+          </a:p>
+          <a:p>
+            <a:pPr lvl="4"/>
+            <a:r>
+              <a:rPr lang="en-US" dirty="0"/>
+              <a:t>Geometry (multiple)</a:t>
+            </a:r>
+          </a:p>
+          <a:p>
+            <a:pPr lvl="5"/>
+            <a:r>
+              <a:rPr lang="en-US" dirty="0"/>
+              <a:t>Line </a:t>
+            </a:r>
+            <a:r>
+              <a:rPr lang="en-US" dirty="0">
+                <a:sym typeface="Wingdings" pitchFamily="2" charset="2"/>
+              </a:rPr>
+              <a:t></a:t>
+            </a:r>
+            <a:r>
+              <a:rPr lang="en-US" dirty="0"/>
+              <a:t> start point in E,N </a:t>
+            </a:r>
+            <a:r>
+              <a:rPr lang="en-US" dirty="0" err="1"/>
+              <a:t>coords</a:t>
+            </a:r>
+            <a:r>
+              <a:rPr lang="en-US" dirty="0"/>
+              <a:t>, start point in s </a:t>
+            </a:r>
+            <a:r>
+              <a:rPr lang="en-US" dirty="0" err="1"/>
+              <a:t>coord</a:t>
+            </a:r>
+            <a:r>
+              <a:rPr lang="en-US" dirty="0"/>
+              <a:t>, heading, length</a:t>
+            </a:r>
+          </a:p>
+          <a:p>
+            <a:pPr lvl="5"/>
+            <a:r>
+              <a:rPr lang="en-US" dirty="0"/>
+              <a:t>Arc </a:t>
+            </a:r>
+            <a:r>
+              <a:rPr lang="en-US" dirty="0">
+                <a:sym typeface="Wingdings" pitchFamily="2" charset="2"/>
+              </a:rPr>
+              <a:t></a:t>
+            </a:r>
+            <a:r>
+              <a:rPr lang="en-US" dirty="0"/>
+              <a:t> start point in E,N </a:t>
+            </a:r>
+            <a:r>
+              <a:rPr lang="en-US" dirty="0" err="1"/>
+              <a:t>coords</a:t>
+            </a:r>
+            <a:r>
+              <a:rPr lang="en-US" dirty="0"/>
+              <a:t>, start point in s </a:t>
+            </a:r>
+            <a:r>
+              <a:rPr lang="en-US" dirty="0" err="1"/>
+              <a:t>coord</a:t>
+            </a:r>
+            <a:r>
+              <a:rPr lang="en-US" dirty="0"/>
+              <a:t>, initial heading, length, curvature</a:t>
+            </a:r>
+          </a:p>
+          <a:p>
+            <a:pPr lvl="5"/>
+            <a:r>
+              <a:rPr lang="en-US" dirty="0"/>
+              <a:t>Spiral </a:t>
+            </a:r>
+            <a:r>
+              <a:rPr lang="en-US" dirty="0">
+                <a:sym typeface="Wingdings" pitchFamily="2" charset="2"/>
+              </a:rPr>
+              <a:t> start point in E,N </a:t>
+            </a:r>
+            <a:r>
+              <a:rPr lang="en-US" dirty="0" err="1">
+                <a:sym typeface="Wingdings" pitchFamily="2" charset="2"/>
+              </a:rPr>
+              <a:t>coords</a:t>
+            </a:r>
+            <a:r>
+              <a:rPr lang="en-US" dirty="0">
+                <a:sym typeface="Wingdings" pitchFamily="2" charset="2"/>
+              </a:rPr>
+              <a:t>, start point in s </a:t>
+            </a:r>
+            <a:r>
+              <a:rPr lang="en-US" dirty="0" err="1">
+                <a:sym typeface="Wingdings" pitchFamily="2" charset="2"/>
+              </a:rPr>
+              <a:t>coord</a:t>
+            </a:r>
+            <a:r>
+              <a:rPr lang="en-US" dirty="0">
+                <a:sym typeface="Wingdings" pitchFamily="2" charset="2"/>
+              </a:rPr>
+              <a:t>, initial heading, length, initial curvature, ending curvature</a:t>
+            </a:r>
+          </a:p>
+          <a:p>
+            <a:pPr lvl="5"/>
+            <a:r>
+              <a:rPr lang="en-US" dirty="0"/>
+              <a:t>Parametric polynomial</a:t>
+            </a:r>
+          </a:p>
+          <a:p>
+            <a:pPr lvl="3"/>
+            <a:r>
+              <a:rPr lang="en-US" dirty="0"/>
+              <a:t>Lanes</a:t>
+            </a:r>
+          </a:p>
+          <a:p>
+            <a:pPr lvl="4"/>
+            <a:r>
+              <a:rPr lang="en-US" dirty="0"/>
+              <a:t>Lane Segment(multiple) -&gt; start point in s </a:t>
+            </a:r>
+            <a:r>
+              <a:rPr lang="en-US" dirty="0" err="1"/>
+              <a:t>coord</a:t>
+            </a:r>
+            <a:endParaRPr lang="en-US" dirty="0"/>
+          </a:p>
+          <a:p>
+            <a:pPr lvl="5"/>
+            <a:r>
+              <a:rPr lang="en-US" dirty="0"/>
+              <a:t>Left, Center, Right</a:t>
+            </a:r>
+          </a:p>
+          <a:p>
+            <a:pPr lvl="6"/>
+            <a:r>
+              <a:rPr lang="en-US" dirty="0"/>
+              <a:t>Lane (multiple)</a:t>
+            </a:r>
+          </a:p>
+          <a:p>
+            <a:pPr lvl="7"/>
+            <a:r>
+              <a:rPr lang="en-US" dirty="0"/>
+              <a:t>Width (multiple)-&gt; cubic polynomial form defining profile in </a:t>
+            </a:r>
+            <a:r>
+              <a:rPr lang="en-US" dirty="0" err="1"/>
+              <a:t>s,t</a:t>
+            </a:r>
+            <a:r>
+              <a:rPr lang="en-US" dirty="0"/>
+              <a:t> coordinates</a:t>
+            </a:r>
+          </a:p>
+          <a:p>
+            <a:pPr lvl="7"/>
+            <a:r>
+              <a:rPr lang="en-US" dirty="0" err="1"/>
+              <a:t>RoadMark</a:t>
+            </a:r>
+            <a:r>
+              <a:rPr lang="en-US" dirty="0"/>
+              <a:t> -&gt; </a:t>
+            </a:r>
+          </a:p>
+          <a:p>
+            <a:pPr lvl="3"/>
+            <a:r>
+              <a:rPr lang="en-US" dirty="0"/>
+              <a:t>Objects</a:t>
+            </a:r>
+          </a:p>
+          <a:p>
+            <a:pPr lvl="4"/>
+            <a:r>
+              <a:rPr lang="en-US" dirty="0"/>
+              <a:t>Object (multiple)</a:t>
+            </a:r>
+          </a:p>
+          <a:p>
+            <a:pPr lvl="5"/>
+            <a:r>
+              <a:rPr lang="en-US" dirty="0"/>
+              <a:t>Location of object origin in S,T </a:t>
+            </a:r>
+            <a:r>
+              <a:rPr lang="en-US" dirty="0" err="1"/>
+              <a:t>coords</a:t>
+            </a:r>
+            <a:endParaRPr lang="en-US" dirty="0"/>
+          </a:p>
+          <a:p>
+            <a:pPr lvl="5"/>
+            <a:r>
+              <a:rPr lang="en-US" dirty="0"/>
+              <a:t>Bounding box (length, width or radius of circle in </a:t>
+            </a:r>
+            <a:r>
+              <a:rPr lang="en-US" dirty="0" err="1"/>
+              <a:t>u,v</a:t>
+            </a:r>
+            <a:r>
+              <a:rPr lang="en-US" dirty="0"/>
+              <a:t> </a:t>
+            </a:r>
+            <a:r>
+              <a:rPr lang="en-US" dirty="0" err="1"/>
+              <a:t>coords</a:t>
+            </a:r>
+            <a:r>
+              <a:rPr lang="en-US" dirty="0"/>
+              <a:t>)</a:t>
+            </a:r>
+          </a:p>
+          <a:p>
+            <a:pPr lvl="5"/>
+            <a:r>
+              <a:rPr lang="en-US" dirty="0"/>
+              <a:t>Outline</a:t>
+            </a:r>
+          </a:p>
+          <a:p>
+            <a:pPr lvl="6"/>
+            <a:r>
+              <a:rPr lang="en-US" dirty="0"/>
+              <a:t>Corners in S,T </a:t>
+            </a:r>
+            <a:r>
+              <a:rPr lang="en-US" dirty="0" err="1"/>
+              <a:t>coords</a:t>
+            </a:r>
+            <a:r>
+              <a:rPr lang="en-US" dirty="0"/>
+              <a:t> or local </a:t>
+            </a:r>
+            <a:r>
+              <a:rPr lang="en-US" dirty="0" err="1"/>
+              <a:t>u,v</a:t>
+            </a:r>
+            <a:r>
+              <a:rPr lang="en-US" dirty="0"/>
+              <a:t> </a:t>
+            </a:r>
+            <a:r>
+              <a:rPr lang="en-US" dirty="0" err="1"/>
+              <a:t>coords</a:t>
+            </a:r>
+            <a:endParaRPr lang="en-US" dirty="0"/>
+          </a:p>
+          <a:p>
+            <a:pPr lvl="5"/>
+            <a:r>
+              <a:rPr lang="en-US" dirty="0"/>
+              <a:t>Repeat element to repeat objects with linearly varying parameters</a:t>
+            </a:r>
+          </a:p>
+          <a:p>
             <a:r>
               <a:rPr lang="en-US" dirty="0" err="1"/>
               <a:t>OpenDRIVE</a:t>
             </a:r>
             <a:r>
               <a:rPr lang="en-US" dirty="0"/>
-              <a:t> road structure.</a:t>
-            </a:r>
-          </a:p>
-          <a:p>
-            <a:pPr lvl="1"/>
-            <a:r>
-              <a:rPr lang="en-US" dirty="0"/>
-              <a:t>Interpretation of the XML is so-so:</a:t>
-            </a:r>
-          </a:p>
-          <a:p>
-            <a:pPr lvl="2"/>
-            <a:r>
-              <a:rPr lang="en-US" dirty="0"/>
-              <a:t>Fields are properly labeled according to the associated XML element</a:t>
-            </a:r>
-          </a:p>
-          <a:p>
-            <a:pPr lvl="2"/>
-            <a:r>
-              <a:rPr lang="en-US" dirty="0"/>
-              <a:t>Multiple fields (e.g. roads, geometry elements of a road, objects) are listed in structure arrays, which make sense</a:t>
-            </a:r>
-          </a:p>
-          <a:p>
-            <a:pPr lvl="2"/>
-            <a:r>
-              <a:rPr lang="en-US" dirty="0"/>
-              <a:t>All data values at the lowest level of the “tree” are represented in strings and must be converted with str2num() or str2double() for calculations in MATLAB</a:t>
-            </a:r>
-          </a:p>
-          <a:p>
-            <a:pPr lvl="2"/>
-            <a:r>
-              <a:rPr lang="en-US" dirty="0"/>
-              <a:t>Every element has a separate “Attributes” structure rather than including the attributes in the element itself, leading to “deeper” addressing of the actual data</a:t>
+              <a:t> 2.0 will break almost everything that depends on these definitions!!!</a:t>
             </a:r>
           </a:p>
         </p:txBody>
@@ -4609,7 +4411,7 @@
     </p:spTree>
     <p:extLst>
       <p:ext uri="{BB962C8B-B14F-4D97-AF65-F5344CB8AC3E}">
-        <p14:creationId xmlns:p14="http://schemas.microsoft.com/office/powerpoint/2010/main" val="1040537709"/>
+        <p14:creationId xmlns:p14="http://schemas.microsoft.com/office/powerpoint/2010/main" val="2353100100"/>
       </p:ext>
     </p:extLst>
   </p:cSld>
@@ -4641,7 +4443,7 @@
           <p:cNvPr id="2" name="Title 1">
             <a:extLst>
               <a:ext uri="{FF2B5EF4-FFF2-40B4-BE49-F238E27FC236}">
-                <a16:creationId xmlns:a16="http://schemas.microsoft.com/office/drawing/2014/main" id="{0CCE5DE5-E8EF-E547-92DF-4302DBB5E8CB}"/>
+                <a16:creationId xmlns:a16="http://schemas.microsoft.com/office/drawing/2014/main" id="{F2C5B6FB-CA95-BA47-A2EC-C987EC6D56B7}"/>
               </a:ext>
             </a:extLst>
           </p:cNvPr>
@@ -4655,7 +4457,7 @@
         <p:spPr>
           <a:xfrm>
             <a:off x="0" y="18255"/>
-            <a:ext cx="12192000" cy="1325563"/>
+            <a:ext cx="10515600" cy="1325563"/>
           </a:xfrm>
         </p:spPr>
         <p:txBody>
@@ -4663,16 +4465,12 @@
           <a:lstStyle/>
           <a:p>
             <a:r>
-              <a:rPr lang="en-US" dirty="0"/>
-              <a:t>Good parts of </a:t>
-            </a:r>
-            <a:r>
               <a:rPr lang="en-US" dirty="0" err="1"/>
               <a:t>OpenDRIVE</a:t>
             </a:r>
             <a:r>
               <a:rPr lang="en-US" dirty="0"/>
-              <a:t> structure in MATLAB</a:t>
+              <a:t> -&gt; MATLAB</a:t>
             </a:r>
           </a:p>
         </p:txBody>
@@ -4682,7 +4480,7 @@
           <p:cNvPr id="3" name="Content Placeholder 2">
             <a:extLst>
               <a:ext uri="{FF2B5EF4-FFF2-40B4-BE49-F238E27FC236}">
-                <a16:creationId xmlns:a16="http://schemas.microsoft.com/office/drawing/2014/main" id="{1BB47D49-096D-AE45-8BB4-6795502A7C47}"/>
+                <a16:creationId xmlns:a16="http://schemas.microsoft.com/office/drawing/2014/main" id="{BA6B05A8-E34C-5546-A3CE-EF0F6C979B90}"/>
               </a:ext>
             </a:extLst>
           </p:cNvPr>
@@ -4695,7 +4493,7 @@
         </p:nvSpPr>
         <p:spPr>
           <a:xfrm>
-            <a:off x="0" y="1343817"/>
+            <a:off x="0" y="1343818"/>
             <a:ext cx="12192000" cy="5495927"/>
           </a:xfrm>
         </p:spPr>
@@ -4705,47 +4503,65 @@
           <a:p>
             <a:r>
               <a:rPr lang="en-US" dirty="0"/>
-              <a:t>Cell arrays are used anywhere multiple elements exist at a level</a:t>
+              <a:t>Importing </a:t>
+            </a:r>
+            <a:r>
+              <a:rPr lang="en-US" dirty="0" err="1"/>
+              <a:t>OpenDRIVE</a:t>
+            </a:r>
+            <a:r>
+              <a:rPr lang="en-US" dirty="0"/>
+              <a:t> data to MATLAB is fairly straightforward</a:t>
             </a:r>
           </a:p>
           <a:p>
             <a:pPr lvl="1"/>
             <a:r>
               <a:rPr lang="en-US" dirty="0"/>
-              <a:t>Easy to iterate over the cell arrays (though requires loops)</a:t>
-            </a:r>
-          </a:p>
-          <a:p>
-            <a:r>
-              <a:rPr lang="en-US" dirty="0"/>
-              <a:t>Easy to compute (X,Y) </a:t>
+              <a:t>There exist several xml2struct tools that can convert the XML into a MATLAB structure that preserves the hierarchy of the </a:t>
             </a:r>
             <a:r>
               <a:rPr lang="en-US" dirty="0" err="1"/>
-              <a:t>coords</a:t>
-            </a:r>
-            <a:r>
-              <a:rPr lang="en-US" dirty="0"/>
-              <a:t> from (S,T) representation</a:t>
-            </a:r>
-          </a:p>
-          <a:p>
-            <a:r>
-              <a:rPr lang="en-US" dirty="0"/>
-              <a:t>Each segment has initial pose (x0,y0), h0 and s0 plus the geometry descriptors and can thus be loaded/plotted separately from the others</a:t>
-            </a:r>
-          </a:p>
-          <a:p>
-            <a:r>
-              <a:rPr lang="en-US" dirty="0"/>
-              <a:t>Objects can be “indexed” by station to determine which segment to compute the geometry from</a:t>
+              <a:t>OpenDRIVE</a:t>
+            </a:r>
+            <a:r>
+              <a:rPr lang="en-US" dirty="0"/>
+              <a:t> road structure.</a:t>
             </a:r>
           </a:p>
           <a:p>
             <a:pPr lvl="1"/>
             <a:r>
               <a:rPr lang="en-US" dirty="0"/>
-              <a:t>The initial pose of the segment allows for “local” computations using the segment initial values rather than referencing the road start</a:t>
+              <a:t>Interpretation of the XML is so-so:</a:t>
+            </a:r>
+          </a:p>
+          <a:p>
+            <a:pPr lvl="2"/>
+            <a:r>
+              <a:rPr lang="en-US" dirty="0"/>
+              <a:t>Fields are properly labeled according to the associated XML element</a:t>
+            </a:r>
+          </a:p>
+          <a:p>
+            <a:pPr lvl="2"/>
+            <a:r>
+              <a:rPr lang="en-US" dirty="0"/>
+              <a:t>Multiple fields (e.g. roads, geometry elements of a road, objects) are listed in structure arrays, which make sense</a:t>
+            </a:r>
+          </a:p>
+          <a:p>
+            <a:pPr lvl="2"/>
+            <a:r>
+              <a:rPr lang="en-US" dirty="0"/>
+              <a:t>All data values at the lowest level of the “tree” are represented in strings and must be converted with str2num() or str2double() for calculations in MATLAB</a:t>
+            </a:r>
+          </a:p>
+          <a:p>
+            <a:pPr lvl="2"/>
+            <a:r>
+              <a:rPr lang="en-US" dirty="0"/>
+              <a:t>Every element has a separate “Attributes” structure rather than including the attributes in the element itself, leading to “deeper” addressing of the actual data</a:t>
             </a:r>
           </a:p>
         </p:txBody>
@@ -4753,7 +4569,7 @@
     </p:spTree>
     <p:extLst>
       <p:ext uri="{BB962C8B-B14F-4D97-AF65-F5344CB8AC3E}">
-        <p14:creationId xmlns:p14="http://schemas.microsoft.com/office/powerpoint/2010/main" val="3420980263"/>
+        <p14:creationId xmlns:p14="http://schemas.microsoft.com/office/powerpoint/2010/main" val="1040537709"/>
       </p:ext>
     </p:extLst>
   </p:cSld>
@@ -4799,7 +4615,7 @@
         <p:spPr>
           <a:xfrm>
             <a:off x="0" y="18255"/>
-            <a:ext cx="10515600" cy="1325563"/>
+            <a:ext cx="12192000" cy="1325563"/>
           </a:xfrm>
         </p:spPr>
         <p:txBody>
@@ -4808,7 +4624,7 @@
           <a:p>
             <a:r>
               <a:rPr lang="en-US" dirty="0"/>
-              <a:t>Bad parts of </a:t>
+              <a:t>Good parts of </a:t>
             </a:r>
             <a:r>
               <a:rPr lang="en-US" dirty="0" err="1"/>
@@ -4839,196 +4655,57 @@
         </p:nvSpPr>
         <p:spPr>
           <a:xfrm>
-            <a:off x="0" y="1343818"/>
+            <a:off x="0" y="1343817"/>
             <a:ext cx="12192000" cy="5495927"/>
           </a:xfrm>
         </p:spPr>
         <p:txBody>
-          <a:bodyPr>
-            <a:normAutofit fontScale="92500" lnSpcReduction="10000"/>
-          </a:bodyPr>
-          <a:lstStyle/>
-          <a:p>
-            <a:r>
-              <a:rPr lang="en-US" dirty="0"/>
-              <a:t>The xml2struct function produces inconsistent structure hierarchies when layers contain only a single element</a:t>
+          <a:bodyPr/>
+          <a:lstStyle/>
+          <a:p>
+            <a:r>
+              <a:rPr lang="en-US" dirty="0"/>
+              <a:t>Cell arrays are used anywhere multiple elements exist at a level</a:t>
             </a:r>
           </a:p>
           <a:p>
             <a:pPr lvl="1"/>
             <a:r>
               <a:rPr lang="en-US" dirty="0"/>
-              <a:t>Cell arrays of structures for multiples, structure for singles</a:t>
+              <a:t>Easy to iterate over the cell arrays (though requires loops)</a:t>
+            </a:r>
+          </a:p>
+          <a:p>
+            <a:r>
+              <a:rPr lang="en-US" dirty="0"/>
+              <a:t>Easy to compute (X,Y) </a:t>
+            </a:r>
+            <a:r>
+              <a:rPr lang="en-US" dirty="0" err="1"/>
+              <a:t>coords</a:t>
+            </a:r>
+            <a:r>
+              <a:rPr lang="en-US" dirty="0"/>
+              <a:t> from (S,T) representation</a:t>
+            </a:r>
+          </a:p>
+          <a:p>
+            <a:r>
+              <a:rPr lang="en-US" dirty="0"/>
+              <a:t>Each segment has initial pose (x0,y0), h0 and s0 plus the geometry descriptors and can thus be loaded/plotted separately from the others</a:t>
+            </a:r>
+          </a:p>
+          <a:p>
+            <a:r>
+              <a:rPr lang="en-US" dirty="0"/>
+              <a:t>Objects can be “indexed” by station to determine which segment to compute the geometry from</a:t>
             </a:r>
           </a:p>
           <a:p>
             <a:pPr lvl="1"/>
             <a:r>
-              <a:rPr lang="en-US" dirty="0">
-                <a:solidFill>
-                  <a:schemeClr val="accent6">
-                    <a:lumMod val="75000"/>
-                  </a:schemeClr>
-                </a:solidFill>
-              </a:rPr>
-              <a:t>Addressed by </a:t>
-            </a:r>
-            <a:r>
-              <a:rPr lang="en-US" dirty="0" err="1">
-                <a:solidFill>
-                  <a:schemeClr val="accent6">
-                    <a:lumMod val="75000"/>
-                  </a:schemeClr>
-                </a:solidFill>
-              </a:rPr>
-              <a:t>fcn_RoadSeg_convertXODRtoMATLABStruct</a:t>
-            </a:r>
-            <a:r>
-              <a:rPr lang="en-US" dirty="0">
-                <a:solidFill>
-                  <a:schemeClr val="accent6">
-                    <a:lumMod val="75000"/>
-                  </a:schemeClr>
-                </a:solidFill>
-              </a:rPr>
-              <a:t>()</a:t>
-            </a:r>
-          </a:p>
-          <a:p>
-            <a:r>
-              <a:rPr lang="en-US" dirty="0"/>
-              <a:t>Reliant on proper XODR formatting to ensure segment ordering is correct (in order of increasing station)</a:t>
-            </a:r>
-          </a:p>
-          <a:p>
-            <a:pPr lvl="1"/>
-            <a:r>
-              <a:rPr lang="en-US" dirty="0">
-                <a:solidFill>
-                  <a:schemeClr val="accent6">
-                    <a:lumMod val="75000"/>
-                  </a:schemeClr>
-                </a:solidFill>
-              </a:rPr>
-              <a:t>Addressed by </a:t>
-            </a:r>
-            <a:r>
-              <a:rPr lang="en-US" dirty="0" err="1">
-                <a:solidFill>
-                  <a:schemeClr val="accent6">
-                    <a:lumMod val="75000"/>
-                  </a:schemeClr>
-                </a:solidFill>
-              </a:rPr>
-              <a:t>fcn_RoadSeg_XODRSegmentChecks</a:t>
-            </a:r>
-            <a:r>
-              <a:rPr lang="en-US" dirty="0">
-                <a:solidFill>
-                  <a:schemeClr val="accent6">
-                    <a:lumMod val="75000"/>
-                  </a:schemeClr>
-                </a:solidFill>
-              </a:rPr>
-              <a:t>()</a:t>
-            </a:r>
-            <a:endParaRPr lang="en-US" dirty="0"/>
-          </a:p>
-          <a:p>
-            <a:r>
-              <a:rPr lang="en-US" dirty="0"/>
-              <a:t>Malformed segments or inconsistencies in XODR will transfer through to the MATLAB structure</a:t>
-            </a:r>
-          </a:p>
-          <a:p>
-            <a:pPr lvl="1"/>
-            <a:r>
-              <a:rPr lang="en-US" dirty="0"/>
-              <a:t>May need to have a MATLAB routine to check that (</a:t>
-            </a:r>
-            <a:r>
-              <a:rPr lang="en-US" dirty="0" err="1"/>
-              <a:t>xF,yF</a:t>
-            </a:r>
-            <a:r>
-              <a:rPr lang="en-US" dirty="0"/>
-              <a:t>) as well as </a:t>
-            </a:r>
-            <a:r>
-              <a:rPr lang="en-US" dirty="0" err="1"/>
-              <a:t>hF</a:t>
-            </a:r>
-            <a:r>
-              <a:rPr lang="en-US" dirty="0"/>
-              <a:t> at </a:t>
-            </a:r>
-            <a:r>
-              <a:rPr lang="en-US" dirty="0" err="1"/>
-              <a:t>sF</a:t>
-            </a:r>
-            <a:r>
-              <a:rPr lang="en-US" dirty="0"/>
-              <a:t> matches with (x0,y0) as well as h0 at s0 of the next segment</a:t>
-            </a:r>
-          </a:p>
-          <a:p>
-            <a:pPr lvl="1"/>
-            <a:r>
-              <a:rPr lang="en-US" dirty="0">
-                <a:solidFill>
-                  <a:schemeClr val="accent6">
-                    <a:lumMod val="75000"/>
-                  </a:schemeClr>
-                </a:solidFill>
-              </a:rPr>
-              <a:t>Addressed by </a:t>
-            </a:r>
-            <a:r>
-              <a:rPr lang="en-US" dirty="0" err="1">
-                <a:solidFill>
-                  <a:schemeClr val="accent6">
-                    <a:lumMod val="75000"/>
-                  </a:schemeClr>
-                </a:solidFill>
-              </a:rPr>
-              <a:t>fcn_RoadSeg_XODRSegmentChecks</a:t>
-            </a:r>
-            <a:r>
-              <a:rPr lang="en-US" dirty="0">
-                <a:solidFill>
-                  <a:schemeClr val="accent6">
-                    <a:lumMod val="75000"/>
-                  </a:schemeClr>
-                </a:solidFill>
-              </a:rPr>
-              <a:t>()</a:t>
-            </a:r>
-          </a:p>
-          <a:p>
-            <a:r>
-              <a:rPr lang="en-US" dirty="0"/>
-              <a:t>Need a separate lookup table to correlate objects with road geometry segments</a:t>
-            </a:r>
-          </a:p>
-          <a:p>
-            <a:r>
-              <a:rPr lang="en-US" dirty="0"/>
-              <a:t>Objects do not have any built-in attributes for appearance (e.g. color)</a:t>
-            </a:r>
-          </a:p>
-          <a:p>
-            <a:pPr lvl="1"/>
-            <a:r>
-              <a:rPr lang="en-US" dirty="0"/>
-              <a:t>Can be stored in &lt;</a:t>
-            </a:r>
-            <a:r>
-              <a:rPr lang="en-US" dirty="0" err="1"/>
-              <a:t>userData</a:t>
-            </a:r>
-            <a:r>
-              <a:rPr lang="en-US" dirty="0"/>
-              <a:t>&gt; within the object elements</a:t>
+              <a:rPr lang="en-US" dirty="0"/>
+              <a:t>The initial pose of the segment allows for “local” computations using the segment initial values rather than referencing the road start</a:t>
             </a:r>
           </a:p>
         </p:txBody>
@@ -5036,7 +4713,7 @@
     </p:spTree>
     <p:extLst>
       <p:ext uri="{BB962C8B-B14F-4D97-AF65-F5344CB8AC3E}">
-        <p14:creationId xmlns:p14="http://schemas.microsoft.com/office/powerpoint/2010/main" val="856063175"/>
+        <p14:creationId xmlns:p14="http://schemas.microsoft.com/office/powerpoint/2010/main" val="3420980263"/>
       </p:ext>
     </p:extLst>
   </p:cSld>
@@ -5068,7 +4745,7 @@
           <p:cNvPr id="2" name="Title 1">
             <a:extLst>
               <a:ext uri="{FF2B5EF4-FFF2-40B4-BE49-F238E27FC236}">
-                <a16:creationId xmlns:a16="http://schemas.microsoft.com/office/drawing/2014/main" id="{57023AE9-566E-C645-9527-E867D6DD0164}"/>
+                <a16:creationId xmlns:a16="http://schemas.microsoft.com/office/drawing/2014/main" id="{0CCE5DE5-E8EF-E547-92DF-4302DBB5E8CB}"/>
               </a:ext>
             </a:extLst>
           </p:cNvPr>
@@ -5081,8 +4758,8 @@
         </p:nvSpPr>
         <p:spPr>
           <a:xfrm>
-            <a:off x="0" y="1"/>
-            <a:ext cx="10515600" cy="898902"/>
+            <a:off x="0" y="18255"/>
+            <a:ext cx="10515600" cy="1325563"/>
           </a:xfrm>
         </p:spPr>
         <p:txBody>
@@ -5091,7 +4768,15 @@
           <a:p>
             <a:r>
               <a:rPr lang="en-US" dirty="0"/>
-              <a:t>Needed code</a:t>
+              <a:t>Bad parts of </a:t>
+            </a:r>
+            <a:r>
+              <a:rPr lang="en-US" dirty="0" err="1"/>
+              <a:t>OpenDRIVE</a:t>
+            </a:r>
+            <a:r>
+              <a:rPr lang="en-US" dirty="0"/>
+              <a:t> structure in MATLAB</a:t>
             </a:r>
           </a:p>
         </p:txBody>
@@ -5101,7 +4786,7 @@
           <p:cNvPr id="3" name="Content Placeholder 2">
             <a:extLst>
               <a:ext uri="{FF2B5EF4-FFF2-40B4-BE49-F238E27FC236}">
-                <a16:creationId xmlns:a16="http://schemas.microsoft.com/office/drawing/2014/main" id="{F47E3397-DD83-5944-915F-B1C23D4146CB}"/>
+                <a16:creationId xmlns:a16="http://schemas.microsoft.com/office/drawing/2014/main" id="{1BB47D49-096D-AE45-8BB4-6795502A7C47}"/>
               </a:ext>
             </a:extLst>
           </p:cNvPr>
@@ -5114,126 +4799,202 @@
         </p:nvSpPr>
         <p:spPr>
           <a:xfrm>
-            <a:off x="0" y="898903"/>
-            <a:ext cx="12192000" cy="5959095"/>
+            <a:off x="0" y="1343818"/>
+            <a:ext cx="12192000" cy="5495927"/>
           </a:xfrm>
         </p:spPr>
         <p:txBody>
-          <a:bodyPr/>
-          <a:lstStyle/>
-          <a:p>
+          <a:bodyPr>
+            <a:normAutofit fontScale="85000" lnSpcReduction="20000"/>
+          </a:bodyPr>
+          <a:lstStyle/>
+          <a:p>
+            <a:r>
+              <a:rPr lang="en-US" dirty="0"/>
+              <a:t>The xml2struct function produces inconsistent structure hierarchies when layers contain only a single element</a:t>
+            </a:r>
+          </a:p>
+          <a:p>
+            <a:pPr lvl="1"/>
+            <a:r>
+              <a:rPr lang="en-US" dirty="0"/>
+              <a:t>Cell arrays of structures for multiples, structure for singles</a:t>
+            </a:r>
+          </a:p>
+          <a:p>
+            <a:pPr lvl="1"/>
+            <a:r>
+              <a:rPr lang="en-US" dirty="0">
+                <a:solidFill>
+                  <a:schemeClr val="accent6">
+                    <a:lumMod val="75000"/>
+                  </a:schemeClr>
+                </a:solidFill>
+              </a:rPr>
+              <a:t>Addressed by </a:t>
+            </a:r>
+            <a:r>
+              <a:rPr lang="en-US" dirty="0" err="1">
+                <a:solidFill>
+                  <a:schemeClr val="accent6">
+                    <a:lumMod val="75000"/>
+                  </a:schemeClr>
+                </a:solidFill>
+              </a:rPr>
+              <a:t>fcn_RoadSeg_convertXODRtoMATLABStruct</a:t>
+            </a:r>
+            <a:r>
+              <a:rPr lang="en-US" dirty="0">
+                <a:solidFill>
+                  <a:schemeClr val="accent6">
+                    <a:lumMod val="75000"/>
+                  </a:schemeClr>
+                </a:solidFill>
+              </a:rPr>
+              <a:t>()</a:t>
+            </a:r>
+          </a:p>
+          <a:p>
+            <a:r>
+              <a:rPr lang="en-US" dirty="0"/>
+              <a:t>Reliant on proper XODR formatting to ensure segment ordering is correct (in order of increasing station)</a:t>
+            </a:r>
+          </a:p>
+          <a:p>
+            <a:pPr lvl="1"/>
+            <a:r>
+              <a:rPr lang="en-US" dirty="0">
+                <a:solidFill>
+                  <a:schemeClr val="accent6">
+                    <a:lumMod val="75000"/>
+                  </a:schemeClr>
+                </a:solidFill>
+              </a:rPr>
+              <a:t>Addressed by </a:t>
+            </a:r>
+            <a:r>
+              <a:rPr lang="en-US" dirty="0" err="1">
+                <a:solidFill>
+                  <a:schemeClr val="accent6">
+                    <a:lumMod val="75000"/>
+                  </a:schemeClr>
+                </a:solidFill>
+              </a:rPr>
+              <a:t>fcn_RoadSeg_XODRSegmentChecks</a:t>
+            </a:r>
+            <a:r>
+              <a:rPr lang="en-US" dirty="0">
+                <a:solidFill>
+                  <a:schemeClr val="accent6">
+                    <a:lumMod val="75000"/>
+                  </a:schemeClr>
+                </a:solidFill>
+              </a:rPr>
+              <a:t>()</a:t>
+            </a:r>
+            <a:endParaRPr lang="en-US" dirty="0"/>
+          </a:p>
+          <a:p>
+            <a:r>
+              <a:rPr lang="en-US" dirty="0"/>
+              <a:t>Malformed segments or inconsistencies in XODR will transfer through to the MATLAB structure</a:t>
+            </a:r>
+          </a:p>
+          <a:p>
+            <a:pPr lvl="1"/>
+            <a:r>
+              <a:rPr lang="en-US" dirty="0"/>
+              <a:t>May need to have a MATLAB routine to check that (</a:t>
+            </a:r>
             <a:r>
               <a:rPr lang="en-US" dirty="0" err="1"/>
-              <a:t>OpenDRIVE</a:t>
-            </a:r>
-            <a:r>
-              <a:rPr lang="en-US" dirty="0"/>
-              <a:t> to MATLAB work zone scenario</a:t>
+              <a:t>xF,yF</a:t>
+            </a:r>
+            <a:r>
+              <a:rPr lang="en-US" dirty="0"/>
+              <a:t>) as well as </a:t>
+            </a:r>
+            <a:r>
+              <a:rPr lang="en-US" dirty="0" err="1"/>
+              <a:t>hF</a:t>
+            </a:r>
+            <a:r>
+              <a:rPr lang="en-US" dirty="0"/>
+              <a:t> at </a:t>
+            </a:r>
+            <a:r>
+              <a:rPr lang="en-US" dirty="0" err="1"/>
+              <a:t>sF</a:t>
+            </a:r>
+            <a:r>
+              <a:rPr lang="en-US" dirty="0"/>
+              <a:t> matches with (x0,y0) as well as h0 at s0 of the next segment</a:t>
             </a:r>
           </a:p>
           <a:p>
             <a:pPr lvl="1"/>
             <a:r>
+              <a:rPr lang="en-US" dirty="0">
+                <a:solidFill>
+                  <a:schemeClr val="accent6">
+                    <a:lumMod val="75000"/>
+                  </a:schemeClr>
+                </a:solidFill>
+              </a:rPr>
+              <a:t>Addressed by </a:t>
+            </a:r>
+            <a:r>
+              <a:rPr lang="en-US" dirty="0" err="1">
+                <a:solidFill>
+                  <a:schemeClr val="accent6">
+                    <a:lumMod val="75000"/>
+                  </a:schemeClr>
+                </a:solidFill>
+              </a:rPr>
+              <a:t>fcn_RoadSeg_XODRSegmentChecks</a:t>
+            </a:r>
+            <a:r>
+              <a:rPr lang="en-US" dirty="0">
+                <a:solidFill>
+                  <a:schemeClr val="accent6">
+                    <a:lumMod val="75000"/>
+                  </a:schemeClr>
+                </a:solidFill>
+              </a:rPr>
+              <a:t>()</a:t>
+            </a:r>
+          </a:p>
+          <a:p>
+            <a:r>
+              <a:rPr lang="en-US" dirty="0"/>
+              <a:t>Need a separate lookup table to correlate objects with the road geometry segment they are located with respect to</a:t>
+            </a:r>
+          </a:p>
+          <a:p>
+            <a:r>
+              <a:rPr lang="en-US" dirty="0"/>
+              <a:t>Lanes are defined section-by-section and can “shift” identifier from one section to the next if a lane appears (begins with zero width and widens) or disappears (narrows to zero width) at the lane section boundary</a:t>
+            </a:r>
+          </a:p>
+          <a:p>
+            <a:r>
+              <a:rPr lang="en-US" dirty="0"/>
+              <a:t>Objects do not have any built-in attributes for appearance (e.g. color)</a:t>
+            </a:r>
+          </a:p>
+          <a:p>
+            <a:pPr lvl="1"/>
+            <a:r>
+              <a:rPr lang="en-US" dirty="0"/>
+              <a:t>Can be stored in &lt;</a:t>
+            </a:r>
+            <a:r>
               <a:rPr lang="en-US" dirty="0" err="1"/>
-              <a:t>OpenDRIVE</a:t>
-            </a:r>
-            <a:r>
-              <a:rPr lang="en-US" dirty="0"/>
-              <a:t> to road reference line</a:t>
-            </a:r>
-          </a:p>
-          <a:p>
-            <a:pPr lvl="2"/>
-            <a:r>
-              <a:rPr lang="en-US" dirty="0"/>
-              <a:t>Extract X,Y points, generate path, convert to traversal</a:t>
-            </a:r>
-          </a:p>
-          <a:p>
-            <a:pPr lvl="2"/>
-            <a:r>
-              <a:rPr lang="en-US" dirty="0"/>
-              <a:t>Plot using the traversal plotting functions in the path library</a:t>
-            </a:r>
-          </a:p>
-          <a:p>
-            <a:pPr lvl="1"/>
-            <a:r>
-              <a:rPr lang="en-US" dirty="0" err="1"/>
-              <a:t>OpenDRIVE</a:t>
-            </a:r>
-            <a:r>
-              <a:rPr lang="en-US" dirty="0"/>
-              <a:t> to lane boundaries</a:t>
-            </a:r>
-          </a:p>
-          <a:p>
-            <a:pPr lvl="2"/>
-            <a:r>
-              <a:rPr lang="en-US" dirty="0"/>
-              <a:t>Extract X,Y points, generate path, convert to traversal</a:t>
-            </a:r>
-          </a:p>
-          <a:p>
-            <a:pPr lvl="2"/>
-            <a:r>
-              <a:rPr lang="en-US" dirty="0"/>
-              <a:t>Plot using the traversal plotting functions in the path library</a:t>
-            </a:r>
-          </a:p>
-          <a:p>
-            <a:pPr lvl="1"/>
-            <a:r>
-              <a:rPr lang="en-US" dirty="0" err="1"/>
-              <a:t>OpenDRIVE</a:t>
-            </a:r>
-            <a:r>
-              <a:rPr lang="en-US" dirty="0"/>
-              <a:t> to world objects</a:t>
-            </a:r>
-          </a:p>
-          <a:p>
-            <a:pPr lvl="2"/>
-            <a:r>
-              <a:rPr lang="en-US" dirty="0"/>
-              <a:t>If </a:t>
-            </a:r>
-            <a:r>
-              <a:rPr lang="en-US" dirty="0" err="1"/>
-              <a:t>cornerroad</a:t>
-            </a:r>
-            <a:r>
-              <a:rPr lang="en-US" dirty="0"/>
-              <a:t> or </a:t>
-            </a:r>
-            <a:r>
-              <a:rPr lang="en-US" dirty="0" err="1"/>
-              <a:t>cornerlocal</a:t>
-            </a:r>
-            <a:r>
-              <a:rPr lang="en-US" dirty="0"/>
-              <a:t> provided, extract X,Y points, convert to patch object</a:t>
-            </a:r>
-          </a:p>
-          <a:p>
-            <a:pPr lvl="2"/>
-            <a:r>
-              <a:rPr lang="en-US" dirty="0"/>
-              <a:t>If only radius provided, create circular patch object at given location</a:t>
-            </a:r>
-          </a:p>
-          <a:p>
-            <a:pPr lvl="2"/>
-            <a:r>
-              <a:rPr lang="en-US" dirty="0"/>
-              <a:t>If only heading, length, width provided, create rectangular patch object at given location </a:t>
-            </a:r>
-          </a:p>
-          <a:p>
-            <a:pPr lvl="2"/>
-            <a:r>
-              <a:rPr lang="en-US" dirty="0"/>
-              <a:t>Plot patch objects using the patch plot functions in the patch library</a:t>
+              <a:t>userData</a:t>
+            </a:r>
+            <a:r>
+              <a:rPr lang="en-US" dirty="0"/>
+              <a:t>&gt; within the object elements</a:t>
             </a:r>
           </a:p>
         </p:txBody>
@@ -5241,18 +5002,108 @@
     </p:spTree>
     <p:extLst>
       <p:ext uri="{BB962C8B-B14F-4D97-AF65-F5344CB8AC3E}">
-        <p14:creationId xmlns:p14="http://schemas.microsoft.com/office/powerpoint/2010/main" val="3164655143"/>
+        <p14:creationId xmlns:p14="http://schemas.microsoft.com/office/powerpoint/2010/main" val="856063175"/>
       </p:ext>
     </p:extLst>
   </p:cSld>
   <p:clrMapOvr>
     <a:masterClrMapping/>
   </p:clrMapOvr>
-  <p:extLst>
-    <p:ext uri="{6950BFC3-D8DA-4A85-94F7-54DA5524770B}">
-      <p188:commentRel xmlns:p188="http://schemas.microsoft.com/office/powerpoint/2018/8/main" r:id="rId3"/>
-    </p:ext>
-  </p:extLst>
+</p:sld>
+</file>
+
+<file path=ppt/slides/slide7.xml><?xml version="1.0" encoding="utf-8"?>
+<p:sld xmlns:a="http://schemas.openxmlformats.org/drawingml/2006/main" xmlns:r="http://schemas.openxmlformats.org/officeDocument/2006/relationships" xmlns:p="http://schemas.openxmlformats.org/presentationml/2006/main">
+  <p:cSld>
+    <p:spTree>
+      <p:nvGrpSpPr>
+        <p:cNvPr id="1" name=""/>
+        <p:cNvGrpSpPr/>
+        <p:nvPr/>
+      </p:nvGrpSpPr>
+      <p:grpSpPr>
+        <a:xfrm>
+          <a:off x="0" y="0"/>
+          <a:ext cx="0" cy="0"/>
+          <a:chOff x="0" y="0"/>
+          <a:chExt cx="0" cy="0"/>
+        </a:xfrm>
+      </p:grpSpPr>
+      <p:sp>
+        <p:nvSpPr>
+          <p:cNvPr id="4" name="Title 3">
+            <a:extLst>
+              <a:ext uri="{FF2B5EF4-FFF2-40B4-BE49-F238E27FC236}">
+                <a16:creationId xmlns:a16="http://schemas.microsoft.com/office/drawing/2014/main" id="{A6E861CB-F9A6-854D-AB0D-F9D1CEB817EE}"/>
+              </a:ext>
+            </a:extLst>
+          </p:cNvPr>
+          <p:cNvSpPr>
+            <a:spLocks noGrp="1"/>
+          </p:cNvSpPr>
+          <p:nvPr>
+            <p:ph type="title"/>
+          </p:nvPr>
+        </p:nvSpPr>
+        <p:spPr/>
+        <p:txBody>
+          <a:bodyPr/>
+          <a:lstStyle/>
+          <a:p>
+            <a:r>
+              <a:rPr lang="en-US" dirty="0"/>
+              <a:t>MATLAB Tools for </a:t>
+            </a:r>
+            <a:r>
+              <a:rPr lang="en-US" dirty="0" err="1"/>
+              <a:t>OpenDRIVE</a:t>
+            </a:r>
+            <a:r>
+              <a:rPr lang="en-US" dirty="0"/>
+              <a:t> Parsing</a:t>
+            </a:r>
+            <a:r>
+              <a:rPr lang="en-US"/>
+              <a:t>/Plotting</a:t>
+            </a:r>
+          </a:p>
+        </p:txBody>
+      </p:sp>
+      <p:sp>
+        <p:nvSpPr>
+          <p:cNvPr id="5" name="Text Placeholder 4">
+            <a:extLst>
+              <a:ext uri="{FF2B5EF4-FFF2-40B4-BE49-F238E27FC236}">
+                <a16:creationId xmlns:a16="http://schemas.microsoft.com/office/drawing/2014/main" id="{1B926251-B07B-2943-AC39-29008F53CCFA}"/>
+              </a:ext>
+            </a:extLst>
+          </p:cNvPr>
+          <p:cNvSpPr>
+            <a:spLocks noGrp="1"/>
+          </p:cNvSpPr>
+          <p:nvPr>
+            <p:ph type="body" idx="1"/>
+          </p:nvPr>
+        </p:nvSpPr>
+        <p:spPr/>
+        <p:txBody>
+          <a:bodyPr/>
+          <a:lstStyle/>
+          <a:p>
+            <a:endParaRPr lang="en-US"/>
+          </a:p>
+        </p:txBody>
+      </p:sp>
+    </p:spTree>
+    <p:extLst>
+      <p:ext uri="{BB962C8B-B14F-4D97-AF65-F5344CB8AC3E}">
+        <p14:creationId xmlns:p14="http://schemas.microsoft.com/office/powerpoint/2010/main" val="1876261003"/>
+      </p:ext>
+    </p:extLst>
+  </p:cSld>
+  <p:clrMapOvr>
+    <a:masterClrMapping/>
+  </p:clrMapOvr>
 </p:sld>
 </file>
 

</xml_diff>

<commit_message>
FEAT: Added a function and associated test script to extract lane geometry from XODR files. Still a bit buggy. Also grabbed a number of XODR test files and added them.
</commit_message>
<xml_diff>
--- a/Documents/OpenDRIVE-MATLAB.pptx
+++ b/Documents/OpenDRIVE-MATLAB.pptx
@@ -5,7 +5,7 @@
     <p:sldMasterId id="2147483648" r:id="rId1"/>
   </p:sldMasterIdLst>
   <p:notesMasterIdLst>
-    <p:notesMasterId r:id="rId9"/>
+    <p:notesMasterId r:id="rId10"/>
   </p:notesMasterIdLst>
   <p:sldIdLst>
     <p:sldId id="256" r:id="rId2"/>
@@ -15,6 +15,7 @@
     <p:sldId id="259" r:id="rId6"/>
     <p:sldId id="261" r:id="rId7"/>
     <p:sldId id="262" r:id="rId8"/>
+    <p:sldId id="264" r:id="rId9"/>
   </p:sldIdLst>
   <p:sldSz cx="12192000" cy="6858000"/>
   <p:notesSz cx="6858000" cy="9144000"/>
@@ -209,7 +210,7 @@
           <a:p>
             <a:fld id="{E25F55F3-6C47-6F44-AA6F-8C97BF80ABB6}" type="datetimeFigureOut">
               <a:rPr lang="en-US" smtClean="0"/>
-              <a:t>4/29/22</a:t>
+              <a:t>5/4/22</a:t>
             </a:fld>
             <a:endParaRPr lang="en-US"/>
           </a:p>
@@ -707,7 +708,7 @@
           <a:p>
             <a:fld id="{34B42132-7ACE-EE46-9408-A55182111835}" type="datetimeFigureOut">
               <a:rPr lang="en-US" smtClean="0"/>
-              <a:t>4/29/22</a:t>
+              <a:t>5/4/22</a:t>
             </a:fld>
             <a:endParaRPr lang="en-US"/>
           </a:p>
@@ -905,7 +906,7 @@
           <a:p>
             <a:fld id="{34B42132-7ACE-EE46-9408-A55182111835}" type="datetimeFigureOut">
               <a:rPr lang="en-US" smtClean="0"/>
-              <a:t>4/29/22</a:t>
+              <a:t>5/4/22</a:t>
             </a:fld>
             <a:endParaRPr lang="en-US"/>
           </a:p>
@@ -1113,7 +1114,7 @@
           <a:p>
             <a:fld id="{34B42132-7ACE-EE46-9408-A55182111835}" type="datetimeFigureOut">
               <a:rPr lang="en-US" smtClean="0"/>
-              <a:t>4/29/22</a:t>
+              <a:t>5/4/22</a:t>
             </a:fld>
             <a:endParaRPr lang="en-US"/>
           </a:p>
@@ -1311,7 +1312,7 @@
           <a:p>
             <a:fld id="{34B42132-7ACE-EE46-9408-A55182111835}" type="datetimeFigureOut">
               <a:rPr lang="en-US" smtClean="0"/>
-              <a:t>4/29/22</a:t>
+              <a:t>5/4/22</a:t>
             </a:fld>
             <a:endParaRPr lang="en-US"/>
           </a:p>
@@ -1586,7 +1587,7 @@
           <a:p>
             <a:fld id="{34B42132-7ACE-EE46-9408-A55182111835}" type="datetimeFigureOut">
               <a:rPr lang="en-US" smtClean="0"/>
-              <a:t>4/29/22</a:t>
+              <a:t>5/4/22</a:t>
             </a:fld>
             <a:endParaRPr lang="en-US"/>
           </a:p>
@@ -1851,7 +1852,7 @@
           <a:p>
             <a:fld id="{34B42132-7ACE-EE46-9408-A55182111835}" type="datetimeFigureOut">
               <a:rPr lang="en-US" smtClean="0"/>
-              <a:t>4/29/22</a:t>
+              <a:t>5/4/22</a:t>
             </a:fld>
             <a:endParaRPr lang="en-US"/>
           </a:p>
@@ -2263,7 +2264,7 @@
           <a:p>
             <a:fld id="{34B42132-7ACE-EE46-9408-A55182111835}" type="datetimeFigureOut">
               <a:rPr lang="en-US" smtClean="0"/>
-              <a:t>4/29/22</a:t>
+              <a:t>5/4/22</a:t>
             </a:fld>
             <a:endParaRPr lang="en-US"/>
           </a:p>
@@ -2404,7 +2405,7 @@
           <a:p>
             <a:fld id="{34B42132-7ACE-EE46-9408-A55182111835}" type="datetimeFigureOut">
               <a:rPr lang="en-US" smtClean="0"/>
-              <a:t>4/29/22</a:t>
+              <a:t>5/4/22</a:t>
             </a:fld>
             <a:endParaRPr lang="en-US"/>
           </a:p>
@@ -2517,7 +2518,7 @@
           <a:p>
             <a:fld id="{34B42132-7ACE-EE46-9408-A55182111835}" type="datetimeFigureOut">
               <a:rPr lang="en-US" smtClean="0"/>
-              <a:t>4/29/22</a:t>
+              <a:t>5/4/22</a:t>
             </a:fld>
             <a:endParaRPr lang="en-US"/>
           </a:p>
@@ -2828,7 +2829,7 @@
           <a:p>
             <a:fld id="{34B42132-7ACE-EE46-9408-A55182111835}" type="datetimeFigureOut">
               <a:rPr lang="en-US" smtClean="0"/>
-              <a:t>4/29/22</a:t>
+              <a:t>5/4/22</a:t>
             </a:fld>
             <a:endParaRPr lang="en-US"/>
           </a:p>
@@ -3116,7 +3117,7 @@
           <a:p>
             <a:fld id="{34B42132-7ACE-EE46-9408-A55182111835}" type="datetimeFigureOut">
               <a:rPr lang="en-US" smtClean="0"/>
-              <a:t>4/29/22</a:t>
+              <a:t>5/4/22</a:t>
             </a:fld>
             <a:endParaRPr lang="en-US"/>
           </a:p>
@@ -3357,7 +3358,7 @@
           <a:p>
             <a:fld id="{34B42132-7ACE-EE46-9408-A55182111835}" type="datetimeFigureOut">
               <a:rPr lang="en-US" smtClean="0"/>
-              <a:t>4/29/22</a:t>
+              <a:t>5/4/22</a:t>
             </a:fld>
             <a:endParaRPr lang="en-US"/>
           </a:p>
@@ -5098,6 +5099,156 @@
     <p:extLst>
       <p:ext uri="{BB962C8B-B14F-4D97-AF65-F5344CB8AC3E}">
         <p14:creationId xmlns:p14="http://schemas.microsoft.com/office/powerpoint/2010/main" val="1876261003"/>
+      </p:ext>
+    </p:extLst>
+  </p:cSld>
+  <p:clrMapOvr>
+    <a:masterClrMapping/>
+  </p:clrMapOvr>
+</p:sld>
+</file>
+
+<file path=ppt/slides/slide8.xml><?xml version="1.0" encoding="utf-8"?>
+<p:sld xmlns:a="http://schemas.openxmlformats.org/drawingml/2006/main" xmlns:r="http://schemas.openxmlformats.org/officeDocument/2006/relationships" xmlns:p="http://schemas.openxmlformats.org/presentationml/2006/main">
+  <p:cSld>
+    <p:spTree>
+      <p:nvGrpSpPr>
+        <p:cNvPr id="1" name=""/>
+        <p:cNvGrpSpPr/>
+        <p:nvPr/>
+      </p:nvGrpSpPr>
+      <p:grpSpPr>
+        <a:xfrm>
+          <a:off x="0" y="0"/>
+          <a:ext cx="0" cy="0"/>
+          <a:chOff x="0" y="0"/>
+          <a:chExt cx="0" cy="0"/>
+        </a:xfrm>
+      </p:grpSpPr>
+      <p:sp>
+        <p:nvSpPr>
+          <p:cNvPr id="4" name="Title 3">
+            <a:extLst>
+              <a:ext uri="{FF2B5EF4-FFF2-40B4-BE49-F238E27FC236}">
+                <a16:creationId xmlns:a16="http://schemas.microsoft.com/office/drawing/2014/main" id="{1CC674D1-A237-DB47-8004-6F66A9BDDA6B}"/>
+              </a:ext>
+            </a:extLst>
+          </p:cNvPr>
+          <p:cNvSpPr>
+            <a:spLocks noGrp="1"/>
+          </p:cNvSpPr>
+          <p:nvPr>
+            <p:ph type="title"/>
+          </p:nvPr>
+        </p:nvSpPr>
+        <p:spPr/>
+        <p:txBody>
+          <a:bodyPr/>
+          <a:lstStyle/>
+          <a:p>
+            <a:r>
+              <a:rPr lang="en-US" dirty="0" err="1"/>
+              <a:t>fcn_RoadSeg_convertXODRtoMATLABStruct</a:t>
+            </a:r>
+            <a:r>
+              <a:rPr lang="en-US" dirty="0"/>
+              <a:t>()</a:t>
+            </a:r>
+          </a:p>
+        </p:txBody>
+      </p:sp>
+      <p:sp>
+        <p:nvSpPr>
+          <p:cNvPr id="5" name="Content Placeholder 4">
+            <a:extLst>
+              <a:ext uri="{FF2B5EF4-FFF2-40B4-BE49-F238E27FC236}">
+                <a16:creationId xmlns:a16="http://schemas.microsoft.com/office/drawing/2014/main" id="{E7F81A59-5FA3-5247-BC0F-B7AFB4B9221F}"/>
+              </a:ext>
+            </a:extLst>
+          </p:cNvPr>
+          <p:cNvSpPr>
+            <a:spLocks noGrp="1"/>
+          </p:cNvSpPr>
+          <p:nvPr>
+            <p:ph idx="1"/>
+          </p:nvPr>
+        </p:nvSpPr>
+        <p:spPr/>
+        <p:txBody>
+          <a:bodyPr/>
+          <a:lstStyle/>
+          <a:p>
+            <a:r>
+              <a:rPr lang="en-US" dirty="0"/>
+              <a:t>Input: </a:t>
+            </a:r>
+            <a:r>
+              <a:rPr lang="en-US" dirty="0" err="1"/>
+              <a:t>OpenDRIVE</a:t>
+            </a:r>
+            <a:r>
+              <a:rPr lang="en-US" dirty="0"/>
+              <a:t> *.</a:t>
+            </a:r>
+            <a:r>
+              <a:rPr lang="en-US" dirty="0" err="1"/>
+              <a:t>xodr</a:t>
+            </a:r>
+            <a:r>
+              <a:rPr lang="en-US" dirty="0"/>
+              <a:t> file</a:t>
+            </a:r>
+          </a:p>
+          <a:p>
+            <a:r>
+              <a:rPr lang="en-US" dirty="0"/>
+              <a:t>Output: MATLAB structure, with nested hierarchical elements consistent with the </a:t>
+            </a:r>
+            <a:r>
+              <a:rPr lang="en-US" dirty="0" err="1"/>
+              <a:t>OpenDRIVE</a:t>
+            </a:r>
+            <a:r>
+              <a:rPr lang="en-US" dirty="0"/>
+              <a:t> specification</a:t>
+            </a:r>
+          </a:p>
+        </p:txBody>
+      </p:sp>
+      <p:pic>
+        <p:nvPicPr>
+          <p:cNvPr id="6" name="Picture 5">
+            <a:extLst>
+              <a:ext uri="{FF2B5EF4-FFF2-40B4-BE49-F238E27FC236}">
+                <a16:creationId xmlns:a16="http://schemas.microsoft.com/office/drawing/2014/main" id="{46EE994D-1E05-004E-AF0B-B927E935D38A}"/>
+              </a:ext>
+            </a:extLst>
+          </p:cNvPr>
+          <p:cNvPicPr>
+            <a:picLocks noChangeAspect="1"/>
+          </p:cNvPicPr>
+          <p:nvPr/>
+        </p:nvPicPr>
+        <p:blipFill>
+          <a:blip r:embed="rId2"/>
+          <a:stretch>
+            <a:fillRect/>
+          </a:stretch>
+        </p:blipFill>
+        <p:spPr>
+          <a:xfrm>
+            <a:off x="691403" y="3303494"/>
+            <a:ext cx="4275044" cy="3429000"/>
+          </a:xfrm>
+          <a:prstGeom prst="rect">
+            <a:avLst/>
+          </a:prstGeom>
+        </p:spPr>
+      </p:pic>
+    </p:spTree>
+    <p:extLst>
+      <p:ext uri="{BB962C8B-B14F-4D97-AF65-F5344CB8AC3E}">
+        <p14:creationId xmlns:p14="http://schemas.microsoft.com/office/powerpoint/2010/main" val="1694471240"/>
       </p:ext>
     </p:extLst>
   </p:cSld>

</xml_diff>

<commit_message>
DOC/FEAT: combined repos to put all MATLAB-OpenDRIVE in one repo, added lots of comments in manual XODR structure creation script, and updated documentation slides
</commit_message>
<xml_diff>
--- a/Documents/OpenDRIVE-MATLAB.pptx
+++ b/Documents/OpenDRIVE-MATLAB.pptx
@@ -5,7 +5,7 @@
     <p:sldMasterId id="2147483648" r:id="rId1"/>
   </p:sldMasterIdLst>
   <p:notesMasterIdLst>
-    <p:notesMasterId r:id="rId21"/>
+    <p:notesMasterId r:id="rId22"/>
   </p:notesMasterIdLst>
   <p:sldIdLst>
     <p:sldId id="256" r:id="rId2"/>
@@ -27,6 +27,7 @@
     <p:sldId id="273" r:id="rId18"/>
     <p:sldId id="274" r:id="rId19"/>
     <p:sldId id="276" r:id="rId20"/>
+    <p:sldId id="277" r:id="rId21"/>
   </p:sldIdLst>
   <p:sldSz cx="12192000" cy="6858000"/>
   <p:notesSz cx="6858000" cy="9144000"/>
@@ -221,7 +222,7 @@
           <a:p>
             <a:fld id="{E25F55F3-6C47-6F44-AA6F-8C97BF80ABB6}" type="datetimeFigureOut">
               <a:rPr lang="en-US" smtClean="0"/>
-              <a:t>5/13/22</a:t>
+              <a:t>5/18/22</a:t>
             </a:fld>
             <a:endParaRPr lang="en-US"/>
           </a:p>
@@ -740,6 +741,90 @@
 </p:notes>
 </file>
 
+<file path=ppt/notesSlides/notesSlide4.xml><?xml version="1.0" encoding="utf-8"?>
+<p:notes xmlns:a="http://schemas.openxmlformats.org/drawingml/2006/main" xmlns:r="http://schemas.openxmlformats.org/officeDocument/2006/relationships" xmlns:p="http://schemas.openxmlformats.org/presentationml/2006/main">
+  <p:cSld>
+    <p:spTree>
+      <p:nvGrpSpPr>
+        <p:cNvPr id="1" name=""/>
+        <p:cNvGrpSpPr/>
+        <p:nvPr/>
+      </p:nvGrpSpPr>
+      <p:grpSpPr>
+        <a:xfrm>
+          <a:off x="0" y="0"/>
+          <a:ext cx="0" cy="0"/>
+          <a:chOff x="0" y="0"/>
+          <a:chExt cx="0" cy="0"/>
+        </a:xfrm>
+      </p:grpSpPr>
+      <p:sp>
+        <p:nvSpPr>
+          <p:cNvPr id="2" name="Slide Image Placeholder 1"/>
+          <p:cNvSpPr>
+            <a:spLocks noGrp="1" noRot="1" noChangeAspect="1"/>
+          </p:cNvSpPr>
+          <p:nvPr>
+            <p:ph type="sldImg"/>
+          </p:nvPr>
+        </p:nvSpPr>
+        <p:spPr/>
+      </p:sp>
+      <p:sp>
+        <p:nvSpPr>
+          <p:cNvPr id="3" name="Notes Placeholder 2"/>
+          <p:cNvSpPr>
+            <a:spLocks noGrp="1"/>
+          </p:cNvSpPr>
+          <p:nvPr>
+            <p:ph type="body" idx="1"/>
+          </p:nvPr>
+        </p:nvSpPr>
+        <p:spPr/>
+        <p:txBody>
+          <a:bodyPr/>
+          <a:lstStyle/>
+          <a:p>
+            <a:endParaRPr lang="en-US" dirty="0"/>
+          </a:p>
+        </p:txBody>
+      </p:sp>
+      <p:sp>
+        <p:nvSpPr>
+          <p:cNvPr id="4" name="Slide Number Placeholder 3"/>
+          <p:cNvSpPr>
+            <a:spLocks noGrp="1"/>
+          </p:cNvSpPr>
+          <p:nvPr>
+            <p:ph type="sldNum" sz="quarter" idx="5"/>
+          </p:nvPr>
+        </p:nvSpPr>
+        <p:spPr/>
+        <p:txBody>
+          <a:bodyPr/>
+          <a:lstStyle/>
+          <a:p>
+            <a:fld id="{BEEFB87A-38AE-FD43-80BF-6BA280226820}" type="slidenum">
+              <a:rPr lang="en-US" smtClean="0"/>
+              <a:t>20</a:t>
+            </a:fld>
+            <a:endParaRPr lang="en-US"/>
+          </a:p>
+        </p:txBody>
+      </p:sp>
+    </p:spTree>
+    <p:extLst>
+      <p:ext uri="{BB962C8B-B14F-4D97-AF65-F5344CB8AC3E}">
+        <p14:creationId xmlns:p14="http://schemas.microsoft.com/office/powerpoint/2010/main" val="1074674244"/>
+      </p:ext>
+    </p:extLst>
+  </p:cSld>
+  <p:clrMapOvr>
+    <a:masterClrMapping/>
+  </p:clrMapOvr>
+</p:notes>
+</file>
+
 <file path=ppt/slideLayouts/slideLayout1.xml><?xml version="1.0" encoding="utf-8"?>
 <p:sldLayout xmlns:a="http://schemas.openxmlformats.org/drawingml/2006/main" xmlns:r="http://schemas.openxmlformats.org/officeDocument/2006/relationships" xmlns:p="http://schemas.openxmlformats.org/presentationml/2006/main" type="title" preserve="1">
   <p:cSld name="Title Slide">
@@ -887,7 +972,7 @@
           <a:p>
             <a:fld id="{34B42132-7ACE-EE46-9408-A55182111835}" type="datetimeFigureOut">
               <a:rPr lang="en-US" smtClean="0"/>
-              <a:t>5/13/22</a:t>
+              <a:t>5/18/22</a:t>
             </a:fld>
             <a:endParaRPr lang="en-US"/>
           </a:p>
@@ -1085,7 +1170,7 @@
           <a:p>
             <a:fld id="{34B42132-7ACE-EE46-9408-A55182111835}" type="datetimeFigureOut">
               <a:rPr lang="en-US" smtClean="0"/>
-              <a:t>5/13/22</a:t>
+              <a:t>5/18/22</a:t>
             </a:fld>
             <a:endParaRPr lang="en-US"/>
           </a:p>
@@ -1293,7 +1378,7 @@
           <a:p>
             <a:fld id="{34B42132-7ACE-EE46-9408-A55182111835}" type="datetimeFigureOut">
               <a:rPr lang="en-US" smtClean="0"/>
-              <a:t>5/13/22</a:t>
+              <a:t>5/18/22</a:t>
             </a:fld>
             <a:endParaRPr lang="en-US"/>
           </a:p>
@@ -1491,7 +1576,7 @@
           <a:p>
             <a:fld id="{34B42132-7ACE-EE46-9408-A55182111835}" type="datetimeFigureOut">
               <a:rPr lang="en-US" smtClean="0"/>
-              <a:t>5/13/22</a:t>
+              <a:t>5/18/22</a:t>
             </a:fld>
             <a:endParaRPr lang="en-US"/>
           </a:p>
@@ -1766,7 +1851,7 @@
           <a:p>
             <a:fld id="{34B42132-7ACE-EE46-9408-A55182111835}" type="datetimeFigureOut">
               <a:rPr lang="en-US" smtClean="0"/>
-              <a:t>5/13/22</a:t>
+              <a:t>5/18/22</a:t>
             </a:fld>
             <a:endParaRPr lang="en-US"/>
           </a:p>
@@ -2031,7 +2116,7 @@
           <a:p>
             <a:fld id="{34B42132-7ACE-EE46-9408-A55182111835}" type="datetimeFigureOut">
               <a:rPr lang="en-US" smtClean="0"/>
-              <a:t>5/13/22</a:t>
+              <a:t>5/18/22</a:t>
             </a:fld>
             <a:endParaRPr lang="en-US"/>
           </a:p>
@@ -2443,7 +2528,7 @@
           <a:p>
             <a:fld id="{34B42132-7ACE-EE46-9408-A55182111835}" type="datetimeFigureOut">
               <a:rPr lang="en-US" smtClean="0"/>
-              <a:t>5/13/22</a:t>
+              <a:t>5/18/22</a:t>
             </a:fld>
             <a:endParaRPr lang="en-US"/>
           </a:p>
@@ -2584,7 +2669,7 @@
           <a:p>
             <a:fld id="{34B42132-7ACE-EE46-9408-A55182111835}" type="datetimeFigureOut">
               <a:rPr lang="en-US" smtClean="0"/>
-              <a:t>5/13/22</a:t>
+              <a:t>5/18/22</a:t>
             </a:fld>
             <a:endParaRPr lang="en-US"/>
           </a:p>
@@ -2697,7 +2782,7 @@
           <a:p>
             <a:fld id="{34B42132-7ACE-EE46-9408-A55182111835}" type="datetimeFigureOut">
               <a:rPr lang="en-US" smtClean="0"/>
-              <a:t>5/13/22</a:t>
+              <a:t>5/18/22</a:t>
             </a:fld>
             <a:endParaRPr lang="en-US"/>
           </a:p>
@@ -3008,7 +3093,7 @@
           <a:p>
             <a:fld id="{34B42132-7ACE-EE46-9408-A55182111835}" type="datetimeFigureOut">
               <a:rPr lang="en-US" smtClean="0"/>
-              <a:t>5/13/22</a:t>
+              <a:t>5/18/22</a:t>
             </a:fld>
             <a:endParaRPr lang="en-US"/>
           </a:p>
@@ -3296,7 +3381,7 @@
           <a:p>
             <a:fld id="{34B42132-7ACE-EE46-9408-A55182111835}" type="datetimeFigureOut">
               <a:rPr lang="en-US" smtClean="0"/>
-              <a:t>5/13/22</a:t>
+              <a:t>5/18/22</a:t>
             </a:fld>
             <a:endParaRPr lang="en-US"/>
           </a:p>
@@ -3537,7 +3622,7 @@
           <a:p>
             <a:fld id="{34B42132-7ACE-EE46-9408-A55182111835}" type="datetimeFigureOut">
               <a:rPr lang="en-US" smtClean="0"/>
-              <a:t>5/13/22</a:t>
+              <a:t>5/18/22</a:t>
             </a:fld>
             <a:endParaRPr lang="en-US"/>
           </a:p>
@@ -8910,6 +8995,210 @@
     <p:extLst>
       <p:ext uri="{BB962C8B-B14F-4D97-AF65-F5344CB8AC3E}">
         <p14:creationId xmlns:p14="http://schemas.microsoft.com/office/powerpoint/2010/main" val="968809613"/>
+      </p:ext>
+    </p:extLst>
+  </p:cSld>
+  <p:clrMapOvr>
+    <a:masterClrMapping/>
+  </p:clrMapOvr>
+</p:sld>
+</file>
+
+<file path=ppt/slides/slide20.xml><?xml version="1.0" encoding="utf-8"?>
+<p:sld xmlns:a="http://schemas.openxmlformats.org/drawingml/2006/main" xmlns:r="http://schemas.openxmlformats.org/officeDocument/2006/relationships" xmlns:p="http://schemas.openxmlformats.org/presentationml/2006/main">
+  <p:cSld>
+    <p:spTree>
+      <p:nvGrpSpPr>
+        <p:cNvPr id="1" name=""/>
+        <p:cNvGrpSpPr/>
+        <p:nvPr/>
+      </p:nvGrpSpPr>
+      <p:grpSpPr>
+        <a:xfrm>
+          <a:off x="0" y="0"/>
+          <a:ext cx="0" cy="0"/>
+          <a:chOff x="0" y="0"/>
+          <a:chExt cx="0" cy="0"/>
+        </a:xfrm>
+      </p:grpSpPr>
+      <p:sp>
+        <p:nvSpPr>
+          <p:cNvPr id="2" name="Title 1">
+            <a:extLst>
+              <a:ext uri="{FF2B5EF4-FFF2-40B4-BE49-F238E27FC236}">
+                <a16:creationId xmlns:a16="http://schemas.microsoft.com/office/drawing/2014/main" id="{B565B524-79FB-1D47-A0F5-0A24C68A2470}"/>
+              </a:ext>
+            </a:extLst>
+          </p:cNvPr>
+          <p:cNvSpPr>
+            <a:spLocks noGrp="1"/>
+          </p:cNvSpPr>
+          <p:nvPr>
+            <p:ph type="title"/>
+          </p:nvPr>
+        </p:nvSpPr>
+        <p:spPr>
+          <a:xfrm>
+            <a:off x="0" y="0"/>
+            <a:ext cx="10515600" cy="749691"/>
+          </a:xfrm>
+        </p:spPr>
+        <p:txBody>
+          <a:bodyPr/>
+          <a:lstStyle/>
+          <a:p>
+            <a:r>
+              <a:rPr lang="en-US" dirty="0"/>
+              <a:t>Next steps</a:t>
+            </a:r>
+          </a:p>
+        </p:txBody>
+      </p:sp>
+      <p:sp>
+        <p:nvSpPr>
+          <p:cNvPr id="3" name="Content Placeholder 2">
+            <a:extLst>
+              <a:ext uri="{FF2B5EF4-FFF2-40B4-BE49-F238E27FC236}">
+                <a16:creationId xmlns:a16="http://schemas.microsoft.com/office/drawing/2014/main" id="{6B9ABB34-818C-EB4D-BFD4-C2023DBC791F}"/>
+              </a:ext>
+            </a:extLst>
+          </p:cNvPr>
+          <p:cNvSpPr>
+            <a:spLocks noGrp="1"/>
+          </p:cNvSpPr>
+          <p:nvPr>
+            <p:ph idx="1"/>
+          </p:nvPr>
+        </p:nvSpPr>
+        <p:spPr>
+          <a:xfrm>
+            <a:off x="0" y="861120"/>
+            <a:ext cx="12192000" cy="5996879"/>
+          </a:xfrm>
+        </p:spPr>
+        <p:txBody>
+          <a:bodyPr>
+            <a:normAutofit/>
+          </a:bodyPr>
+          <a:lstStyle/>
+          <a:p>
+            <a:r>
+              <a:rPr lang="en-US" dirty="0"/>
+              <a:t>There are numerous aspects of </a:t>
+            </a:r>
+            <a:r>
+              <a:rPr lang="en-US" dirty="0" err="1"/>
+              <a:t>OpenDRIVE</a:t>
+            </a:r>
+            <a:r>
+              <a:rPr lang="en-US" dirty="0"/>
+              <a:t> that are not currently included in the code. Some of these should probably be implemented:</a:t>
+            </a:r>
+          </a:p>
+          <a:p>
+            <a:pPr lvl="1"/>
+            <a:r>
+              <a:rPr lang="en-US" dirty="0"/>
+              <a:t>Cubic polynomial road geometry</a:t>
+            </a:r>
+          </a:p>
+          <a:p>
+            <a:pPr lvl="1"/>
+            <a:r>
+              <a:rPr lang="en-US" dirty="0"/>
+              <a:t>Road markings -&gt; reading from a file and plotting (harder) as well as writing (easy in manual construction)</a:t>
+            </a:r>
+          </a:p>
+          <a:p>
+            <a:pPr lvl="1"/>
+            <a:r>
+              <a:rPr lang="en-US" dirty="0"/>
+              <a:t>Lane borders</a:t>
+            </a:r>
+          </a:p>
+          <a:p>
+            <a:r>
+              <a:rPr lang="en-US" dirty="0"/>
+              <a:t>Function </a:t>
+            </a:r>
+            <a:r>
+              <a:rPr lang="en-US" dirty="0" err="1"/>
+              <a:t>fcn_RoadSeg_XODRSegmentChecks</a:t>
+            </a:r>
+            <a:r>
+              <a:rPr lang="en-US" dirty="0"/>
+              <a:t> is a bit limited. There are numerous additional checks that can (should?) be added or modified:</a:t>
+            </a:r>
+          </a:p>
+          <a:p>
+            <a:pPr lvl="1"/>
+            <a:r>
+              <a:rPr lang="en-US" dirty="0"/>
+              <a:t>Lane linkage checks (predecessor tags present for all but first lane section)</a:t>
+            </a:r>
+          </a:p>
+          <a:p>
+            <a:pPr lvl="1"/>
+            <a:r>
+              <a:rPr lang="en-US" dirty="0"/>
+              <a:t>Lane offset continuity check</a:t>
+            </a:r>
+          </a:p>
+          <a:p>
+            <a:pPr lvl="1"/>
+            <a:r>
+              <a:rPr lang="en-US" dirty="0"/>
+              <a:t>Lane width continuity check</a:t>
+            </a:r>
+          </a:p>
+          <a:p>
+            <a:pPr lvl="1"/>
+            <a:r>
+              <a:rPr lang="en-US" dirty="0"/>
+              <a:t>Degenerate object vertices (</a:t>
+            </a:r>
+            <a:r>
+              <a:rPr lang="en-US" dirty="0" err="1"/>
+              <a:t>cornerLocal</a:t>
+            </a:r>
+            <a:r>
+              <a:rPr lang="en-US" dirty="0"/>
+              <a:t> or </a:t>
+            </a:r>
+            <a:r>
+              <a:rPr lang="en-US" dirty="0" err="1"/>
+              <a:t>cornerRoad</a:t>
+            </a:r>
+            <a:r>
+              <a:rPr lang="en-US" dirty="0"/>
+              <a:t>) check</a:t>
+            </a:r>
+          </a:p>
+          <a:p>
+            <a:pPr lvl="1"/>
+            <a:r>
+              <a:rPr lang="en-US" dirty="0"/>
+              <a:t>Ability to include lane widths in the bounding box check (</a:t>
+            </a:r>
+            <a:r>
+              <a:rPr lang="en-US" dirty="0">
+                <a:solidFill>
+                  <a:srgbClr val="FF0000"/>
+                </a:solidFill>
+              </a:rPr>
+              <a:t>this is technically a bug</a:t>
+            </a:r>
+            <a:r>
+              <a:rPr lang="en-US" dirty="0"/>
+              <a:t>)</a:t>
+            </a:r>
+          </a:p>
+        </p:txBody>
+      </p:sp>
+    </p:spTree>
+    <p:extLst>
+      <p:ext uri="{BB962C8B-B14F-4D97-AF65-F5344CB8AC3E}">
+        <p14:creationId xmlns:p14="http://schemas.microsoft.com/office/powerpoint/2010/main" val="2125673837"/>
       </p:ext>
     </p:extLst>
   </p:cSld>

</xml_diff>